<commit_message>
adding powerpoint 3d file
</commit_message>
<xml_diff>
--- a/Paper_Figures/240Pu_paths/3dplot.pptx
+++ b/Paper_Figures/240Pu_paths/3dplot.pptx
@@ -2,18 +2,18 @@
 <file path=ppt/presentation.xml><?xml version="1.0" encoding="utf-8"?>
 <p:presentation xmlns:a="http://schemas.openxmlformats.org/drawingml/2006/main" xmlns:r="http://schemas.openxmlformats.org/officeDocument/2006/relationships" xmlns:p="http://schemas.openxmlformats.org/presentationml/2006/main" saveSubsetFonts="1" autoCompressPictures="0">
   <p:sldMasterIdLst>
-    <p:sldMasterId id="2147483648" r:id="rId1"/>
+    <p:sldMasterId id="2147483672" r:id="rId1"/>
   </p:sldMasterIdLst>
   <p:sldIdLst>
     <p:sldId id="256" r:id="rId2"/>
   </p:sldIdLst>
-  <p:sldSz cx="12192000" cy="6858000"/>
+  <p:sldSz cx="8686800" cy="6858000"/>
   <p:notesSz cx="6858000" cy="9144000"/>
   <p:defaultTextStyle>
     <a:defPPr>
       <a:defRPr lang="en-US"/>
     </a:defPPr>
-    <a:lvl1pPr marL="0" algn="l" defTabSz="914400" rtl="0" eaLnBrk="1" latinLnBrk="0" hangingPunct="1">
+    <a:lvl1pPr marL="0" algn="l" defTabSz="457200" rtl="0" eaLnBrk="1" latinLnBrk="0" hangingPunct="1">
       <a:defRPr sz="1800" kern="1200">
         <a:solidFill>
           <a:schemeClr val="tx1"/>
@@ -23,7 +23,7 @@
         <a:cs typeface="+mn-cs"/>
       </a:defRPr>
     </a:lvl1pPr>
-    <a:lvl2pPr marL="457200" algn="l" defTabSz="914400" rtl="0" eaLnBrk="1" latinLnBrk="0" hangingPunct="1">
+    <a:lvl2pPr marL="457200" algn="l" defTabSz="457200" rtl="0" eaLnBrk="1" latinLnBrk="0" hangingPunct="1">
       <a:defRPr sz="1800" kern="1200">
         <a:solidFill>
           <a:schemeClr val="tx1"/>
@@ -33,7 +33,7 @@
         <a:cs typeface="+mn-cs"/>
       </a:defRPr>
     </a:lvl2pPr>
-    <a:lvl3pPr marL="914400" algn="l" defTabSz="914400" rtl="0" eaLnBrk="1" latinLnBrk="0" hangingPunct="1">
+    <a:lvl3pPr marL="914400" algn="l" defTabSz="457200" rtl="0" eaLnBrk="1" latinLnBrk="0" hangingPunct="1">
       <a:defRPr sz="1800" kern="1200">
         <a:solidFill>
           <a:schemeClr val="tx1"/>
@@ -43,7 +43,7 @@
         <a:cs typeface="+mn-cs"/>
       </a:defRPr>
     </a:lvl3pPr>
-    <a:lvl4pPr marL="1371600" algn="l" defTabSz="914400" rtl="0" eaLnBrk="1" latinLnBrk="0" hangingPunct="1">
+    <a:lvl4pPr marL="1371600" algn="l" defTabSz="457200" rtl="0" eaLnBrk="1" latinLnBrk="0" hangingPunct="1">
       <a:defRPr sz="1800" kern="1200">
         <a:solidFill>
           <a:schemeClr val="tx1"/>
@@ -53,7 +53,7 @@
         <a:cs typeface="+mn-cs"/>
       </a:defRPr>
     </a:lvl4pPr>
-    <a:lvl5pPr marL="1828800" algn="l" defTabSz="914400" rtl="0" eaLnBrk="1" latinLnBrk="0" hangingPunct="1">
+    <a:lvl5pPr marL="1828800" algn="l" defTabSz="457200" rtl="0" eaLnBrk="1" latinLnBrk="0" hangingPunct="1">
       <a:defRPr sz="1800" kern="1200">
         <a:solidFill>
           <a:schemeClr val="tx1"/>
@@ -63,7 +63,7 @@
         <a:cs typeface="+mn-cs"/>
       </a:defRPr>
     </a:lvl5pPr>
-    <a:lvl6pPr marL="2286000" algn="l" defTabSz="914400" rtl="0" eaLnBrk="1" latinLnBrk="0" hangingPunct="1">
+    <a:lvl6pPr marL="2286000" algn="l" defTabSz="457200" rtl="0" eaLnBrk="1" latinLnBrk="0" hangingPunct="1">
       <a:defRPr sz="1800" kern="1200">
         <a:solidFill>
           <a:schemeClr val="tx1"/>
@@ -73,7 +73,7 @@
         <a:cs typeface="+mn-cs"/>
       </a:defRPr>
     </a:lvl6pPr>
-    <a:lvl7pPr marL="2743200" algn="l" defTabSz="914400" rtl="0" eaLnBrk="1" latinLnBrk="0" hangingPunct="1">
+    <a:lvl7pPr marL="2743200" algn="l" defTabSz="457200" rtl="0" eaLnBrk="1" latinLnBrk="0" hangingPunct="1">
       <a:defRPr sz="1800" kern="1200">
         <a:solidFill>
           <a:schemeClr val="tx1"/>
@@ -83,7 +83,7 @@
         <a:cs typeface="+mn-cs"/>
       </a:defRPr>
     </a:lvl7pPr>
-    <a:lvl8pPr marL="3200400" algn="l" defTabSz="914400" rtl="0" eaLnBrk="1" latinLnBrk="0" hangingPunct="1">
+    <a:lvl8pPr marL="3200400" algn="l" defTabSz="457200" rtl="0" eaLnBrk="1" latinLnBrk="0" hangingPunct="1">
       <a:defRPr sz="1800" kern="1200">
         <a:solidFill>
           <a:schemeClr val="tx1"/>
@@ -93,7 +93,7 @@
         <a:cs typeface="+mn-cs"/>
       </a:defRPr>
     </a:lvl8pPr>
-    <a:lvl9pPr marL="3657600" algn="l" defTabSz="914400" rtl="0" eaLnBrk="1" latinLnBrk="0" hangingPunct="1">
+    <a:lvl9pPr marL="3657600" algn="l" defTabSz="457200" rtl="0" eaLnBrk="1" latinLnBrk="0" hangingPunct="1">
       <a:defRPr sz="1800" kern="1200">
         <a:solidFill>
           <a:schemeClr val="tx1"/>
@@ -104,6 +104,11 @@
       </a:defRPr>
     </a:lvl9pPr>
   </p:defaultTextStyle>
+  <p:extLst>
+    <p:ext uri="{EFAFB233-063F-42B5-8137-9DF3F51BA10A}">
+      <p15:sldGuideLst xmlns:p15="http://schemas.microsoft.com/office/powerpoint/2012/main"/>
+    </p:ext>
+  </p:extLst>
 </p:presentation>
 </file>
 
@@ -126,13 +131,7 @@
       </p:grpSpPr>
       <p:sp>
         <p:nvSpPr>
-          <p:cNvPr id="2" name="Title 1">
-            <a:extLst>
-              <a:ext uri="{FF2B5EF4-FFF2-40B4-BE49-F238E27FC236}">
-                <a16:creationId xmlns:a16="http://schemas.microsoft.com/office/drawing/2014/main" id="{E006DB04-DB95-6040-AB06-76C30BDC2D83}"/>
-              </a:ext>
-            </a:extLst>
-          </p:cNvPr>
+          <p:cNvPr id="2" name="Title 1"/>
           <p:cNvSpPr>
             <a:spLocks noGrp="1"/>
           </p:cNvSpPr>
@@ -142,15 +141,15 @@
         </p:nvSpPr>
         <p:spPr>
           <a:xfrm>
-            <a:off x="1524000" y="1122363"/>
-            <a:ext cx="9144000" cy="2387600"/>
+            <a:off x="651510" y="1122363"/>
+            <a:ext cx="7383780" cy="2387600"/>
           </a:xfrm>
         </p:spPr>
         <p:txBody>
           <a:bodyPr anchor="b"/>
           <a:lstStyle>
             <a:lvl1pPr algn="ctr">
-              <a:defRPr sz="6000"/>
+              <a:defRPr sz="5700"/>
             </a:lvl1pPr>
           </a:lstStyle>
           <a:p>
@@ -158,18 +157,13 @@
               <a:rPr lang="en-US"/>
               <a:t>Click to edit Master title style</a:t>
             </a:r>
-          </a:p>
-        </p:txBody>
-      </p:sp>
-      <p:sp>
-        <p:nvSpPr>
-          <p:cNvPr id="3" name="Subtitle 2">
-            <a:extLst>
-              <a:ext uri="{FF2B5EF4-FFF2-40B4-BE49-F238E27FC236}">
-                <a16:creationId xmlns:a16="http://schemas.microsoft.com/office/drawing/2014/main" id="{E6A6F38E-46DC-CC4C-AA29-1B4378B0E371}"/>
-              </a:ext>
-            </a:extLst>
-          </p:cNvPr>
+            <a:endParaRPr lang="en-US" dirty="0"/>
+          </a:p>
+        </p:txBody>
+      </p:sp>
+      <p:sp>
+        <p:nvSpPr>
+          <p:cNvPr id="3" name="Subtitle 2"/>
           <p:cNvSpPr>
             <a:spLocks noGrp="1"/>
           </p:cNvSpPr>
@@ -179,8 +173,8 @@
         </p:nvSpPr>
         <p:spPr>
           <a:xfrm>
-            <a:off x="1524000" y="3602038"/>
-            <a:ext cx="9144000" cy="1655762"/>
+            <a:off x="1085850" y="3602038"/>
+            <a:ext cx="6515100" cy="1655762"/>
           </a:xfrm>
         </p:spPr>
         <p:txBody>
@@ -188,39 +182,39 @@
           <a:lstStyle>
             <a:lvl1pPr marL="0" indent="0" algn="ctr">
               <a:buNone/>
-              <a:defRPr sz="2400"/>
+              <a:defRPr sz="2280"/>
             </a:lvl1pPr>
-            <a:lvl2pPr marL="457200" indent="0" algn="ctr">
-              <a:buNone/>
-              <a:defRPr sz="2000"/>
+            <a:lvl2pPr marL="434340" indent="0" algn="ctr">
+              <a:buNone/>
+              <a:defRPr sz="1900"/>
             </a:lvl2pPr>
-            <a:lvl3pPr marL="914400" indent="0" algn="ctr">
-              <a:buNone/>
-              <a:defRPr sz="1800"/>
+            <a:lvl3pPr marL="868680" indent="0" algn="ctr">
+              <a:buNone/>
+              <a:defRPr sz="1710"/>
             </a:lvl3pPr>
-            <a:lvl4pPr marL="1371600" indent="0" algn="ctr">
-              <a:buNone/>
-              <a:defRPr sz="1600"/>
+            <a:lvl4pPr marL="1303020" indent="0" algn="ctr">
+              <a:buNone/>
+              <a:defRPr sz="1520"/>
             </a:lvl4pPr>
-            <a:lvl5pPr marL="1828800" indent="0" algn="ctr">
-              <a:buNone/>
-              <a:defRPr sz="1600"/>
+            <a:lvl5pPr marL="1737360" indent="0" algn="ctr">
+              <a:buNone/>
+              <a:defRPr sz="1520"/>
             </a:lvl5pPr>
-            <a:lvl6pPr marL="2286000" indent="0" algn="ctr">
-              <a:buNone/>
-              <a:defRPr sz="1600"/>
+            <a:lvl6pPr marL="2171700" indent="0" algn="ctr">
+              <a:buNone/>
+              <a:defRPr sz="1520"/>
             </a:lvl6pPr>
-            <a:lvl7pPr marL="2743200" indent="0" algn="ctr">
-              <a:buNone/>
-              <a:defRPr sz="1600"/>
+            <a:lvl7pPr marL="2606040" indent="0" algn="ctr">
+              <a:buNone/>
+              <a:defRPr sz="1520"/>
             </a:lvl7pPr>
-            <a:lvl8pPr marL="3200400" indent="0" algn="ctr">
-              <a:buNone/>
-              <a:defRPr sz="1600"/>
+            <a:lvl8pPr marL="3040380" indent="0" algn="ctr">
+              <a:buNone/>
+              <a:defRPr sz="1520"/>
             </a:lvl8pPr>
-            <a:lvl9pPr marL="3657600" indent="0" algn="ctr">
-              <a:buNone/>
-              <a:defRPr sz="1600"/>
+            <a:lvl9pPr marL="3474720" indent="0" algn="ctr">
+              <a:buNone/>
+              <a:defRPr sz="1520"/>
             </a:lvl9pPr>
           </a:lstStyle>
           <a:p>
@@ -228,18 +222,13 @@
               <a:rPr lang="en-US"/>
               <a:t>Click to edit Master subtitle style</a:t>
             </a:r>
-          </a:p>
-        </p:txBody>
-      </p:sp>
-      <p:sp>
-        <p:nvSpPr>
-          <p:cNvPr id="4" name="Date Placeholder 3">
-            <a:extLst>
-              <a:ext uri="{FF2B5EF4-FFF2-40B4-BE49-F238E27FC236}">
-                <a16:creationId xmlns:a16="http://schemas.microsoft.com/office/drawing/2014/main" id="{A4625BCE-BD80-9948-93D0-98878780AA52}"/>
-              </a:ext>
-            </a:extLst>
-          </p:cNvPr>
+            <a:endParaRPr lang="en-US" dirty="0"/>
+          </a:p>
+        </p:txBody>
+      </p:sp>
+      <p:sp>
+        <p:nvSpPr>
+          <p:cNvPr id="4" name="Date Placeholder 3"/>
           <p:cNvSpPr>
             <a:spLocks noGrp="1"/>
           </p:cNvSpPr>
@@ -254,7 +243,7 @@
           <a:p>
             <a:fld id="{0F363A7F-1990-1A42-83C2-334856CEA27B}" type="datetimeFigureOut">
               <a:rPr lang="en-US" smtClean="0"/>
-              <a:t>1/13/22</a:t>
+              <a:t>2/25/22</a:t>
             </a:fld>
             <a:endParaRPr lang="en-US"/>
           </a:p>
@@ -262,13 +251,7 @@
       </p:sp>
       <p:sp>
         <p:nvSpPr>
-          <p:cNvPr id="5" name="Footer Placeholder 4">
-            <a:extLst>
-              <a:ext uri="{FF2B5EF4-FFF2-40B4-BE49-F238E27FC236}">
-                <a16:creationId xmlns:a16="http://schemas.microsoft.com/office/drawing/2014/main" id="{2FB15B38-43C4-0948-AD99-D895C644D1E8}"/>
-              </a:ext>
-            </a:extLst>
-          </p:cNvPr>
+          <p:cNvPr id="5" name="Footer Placeholder 4"/>
           <p:cNvSpPr>
             <a:spLocks noGrp="1"/>
           </p:cNvSpPr>
@@ -287,13 +270,7 @@
       </p:sp>
       <p:sp>
         <p:nvSpPr>
-          <p:cNvPr id="6" name="Slide Number Placeholder 5">
-            <a:extLst>
-              <a:ext uri="{FF2B5EF4-FFF2-40B4-BE49-F238E27FC236}">
-                <a16:creationId xmlns:a16="http://schemas.microsoft.com/office/drawing/2014/main" id="{978C17A6-03FB-DD43-8722-E00D51DFAB60}"/>
-              </a:ext>
-            </a:extLst>
-          </p:cNvPr>
+          <p:cNvPr id="6" name="Slide Number Placeholder 5"/>
           <p:cNvSpPr>
             <a:spLocks noGrp="1"/>
           </p:cNvSpPr>
@@ -317,7 +294,7 @@
     </p:spTree>
     <p:extLst>
       <p:ext uri="{BB962C8B-B14F-4D97-AF65-F5344CB8AC3E}">
-        <p14:creationId xmlns:p14="http://schemas.microsoft.com/office/powerpoint/2010/main" val="1293642889"/>
+        <p14:creationId xmlns:p14="http://schemas.microsoft.com/office/powerpoint/2010/main" val="3160727785"/>
       </p:ext>
     </p:extLst>
   </p:cSld>
@@ -346,13 +323,7 @@
       </p:grpSpPr>
       <p:sp>
         <p:nvSpPr>
-          <p:cNvPr id="2" name="Title 1">
-            <a:extLst>
-              <a:ext uri="{FF2B5EF4-FFF2-40B4-BE49-F238E27FC236}">
-                <a16:creationId xmlns:a16="http://schemas.microsoft.com/office/drawing/2014/main" id="{C46AB5DF-71D9-6347-A850-C5FBA29DDEF6}"/>
-              </a:ext>
-            </a:extLst>
-          </p:cNvPr>
+          <p:cNvPr id="2" name="Title 1"/>
           <p:cNvSpPr>
             <a:spLocks noGrp="1"/>
           </p:cNvSpPr>
@@ -369,18 +340,13 @@
               <a:rPr lang="en-US"/>
               <a:t>Click to edit Master title style</a:t>
             </a:r>
-          </a:p>
-        </p:txBody>
-      </p:sp>
-      <p:sp>
-        <p:nvSpPr>
-          <p:cNvPr id="3" name="Vertical Text Placeholder 2">
-            <a:extLst>
-              <a:ext uri="{FF2B5EF4-FFF2-40B4-BE49-F238E27FC236}">
-                <a16:creationId xmlns:a16="http://schemas.microsoft.com/office/drawing/2014/main" id="{51CED7E0-5A5F-E54A-95A0-B4099E3FF764}"/>
-              </a:ext>
-            </a:extLst>
-          </p:cNvPr>
+            <a:endParaRPr lang="en-US" dirty="0"/>
+          </a:p>
+        </p:txBody>
+      </p:sp>
+      <p:sp>
+        <p:nvSpPr>
+          <p:cNvPr id="3" name="Vertical Text Placeholder 2"/>
           <p:cNvSpPr>
             <a:spLocks noGrp="1"/>
           </p:cNvSpPr>
@@ -426,18 +392,13 @@
               <a:rPr lang="en-US"/>
               <a:t>Fifth level</a:t>
             </a:r>
-          </a:p>
-        </p:txBody>
-      </p:sp>
-      <p:sp>
-        <p:nvSpPr>
-          <p:cNvPr id="4" name="Date Placeholder 3">
-            <a:extLst>
-              <a:ext uri="{FF2B5EF4-FFF2-40B4-BE49-F238E27FC236}">
-                <a16:creationId xmlns:a16="http://schemas.microsoft.com/office/drawing/2014/main" id="{B7638865-DAF5-2241-9155-C0A86C495EF6}"/>
-              </a:ext>
-            </a:extLst>
-          </p:cNvPr>
+            <a:endParaRPr lang="en-US" dirty="0"/>
+          </a:p>
+        </p:txBody>
+      </p:sp>
+      <p:sp>
+        <p:nvSpPr>
+          <p:cNvPr id="4" name="Date Placeholder 3"/>
           <p:cNvSpPr>
             <a:spLocks noGrp="1"/>
           </p:cNvSpPr>
@@ -452,7 +413,7 @@
           <a:p>
             <a:fld id="{0F363A7F-1990-1A42-83C2-334856CEA27B}" type="datetimeFigureOut">
               <a:rPr lang="en-US" smtClean="0"/>
-              <a:t>1/13/22</a:t>
+              <a:t>2/25/22</a:t>
             </a:fld>
             <a:endParaRPr lang="en-US"/>
           </a:p>
@@ -460,13 +421,7 @@
       </p:sp>
       <p:sp>
         <p:nvSpPr>
-          <p:cNvPr id="5" name="Footer Placeholder 4">
-            <a:extLst>
-              <a:ext uri="{FF2B5EF4-FFF2-40B4-BE49-F238E27FC236}">
-                <a16:creationId xmlns:a16="http://schemas.microsoft.com/office/drawing/2014/main" id="{2C916690-2382-F648-99BF-CEE9C8229D8C}"/>
-              </a:ext>
-            </a:extLst>
-          </p:cNvPr>
+          <p:cNvPr id="5" name="Footer Placeholder 4"/>
           <p:cNvSpPr>
             <a:spLocks noGrp="1"/>
           </p:cNvSpPr>
@@ -485,13 +440,7 @@
       </p:sp>
       <p:sp>
         <p:nvSpPr>
-          <p:cNvPr id="6" name="Slide Number Placeholder 5">
-            <a:extLst>
-              <a:ext uri="{FF2B5EF4-FFF2-40B4-BE49-F238E27FC236}">
-                <a16:creationId xmlns:a16="http://schemas.microsoft.com/office/drawing/2014/main" id="{C231910F-68EC-1E49-AE58-2BF80A48A7DC}"/>
-              </a:ext>
-            </a:extLst>
-          </p:cNvPr>
+          <p:cNvPr id="6" name="Slide Number Placeholder 5"/>
           <p:cNvSpPr>
             <a:spLocks noGrp="1"/>
           </p:cNvSpPr>
@@ -515,7 +464,7 @@
     </p:spTree>
     <p:extLst>
       <p:ext uri="{BB962C8B-B14F-4D97-AF65-F5344CB8AC3E}">
-        <p14:creationId xmlns:p14="http://schemas.microsoft.com/office/powerpoint/2010/main" val="3687353362"/>
+        <p14:creationId xmlns:p14="http://schemas.microsoft.com/office/powerpoint/2010/main" val="2994010843"/>
       </p:ext>
     </p:extLst>
   </p:cSld>
@@ -544,13 +493,7 @@
       </p:grpSpPr>
       <p:sp>
         <p:nvSpPr>
-          <p:cNvPr id="2" name="Vertical Title 1">
-            <a:extLst>
-              <a:ext uri="{FF2B5EF4-FFF2-40B4-BE49-F238E27FC236}">
-                <a16:creationId xmlns:a16="http://schemas.microsoft.com/office/drawing/2014/main" id="{56DF3EE8-90E8-2346-95B6-297F87E2AD56}"/>
-              </a:ext>
-            </a:extLst>
-          </p:cNvPr>
+          <p:cNvPr id="2" name="Vertical Title 1"/>
           <p:cNvSpPr>
             <a:spLocks noGrp="1"/>
           </p:cNvSpPr>
@@ -560,8 +503,8 @@
         </p:nvSpPr>
         <p:spPr>
           <a:xfrm>
-            <a:off x="8724900" y="365125"/>
-            <a:ext cx="2628900" cy="5811838"/>
+            <a:off x="6216492" y="365125"/>
+            <a:ext cx="1873091" cy="5811838"/>
           </a:xfrm>
         </p:spPr>
         <p:txBody>
@@ -572,18 +515,13 @@
               <a:rPr lang="en-US"/>
               <a:t>Click to edit Master title style</a:t>
             </a:r>
-          </a:p>
-        </p:txBody>
-      </p:sp>
-      <p:sp>
-        <p:nvSpPr>
-          <p:cNvPr id="3" name="Vertical Text Placeholder 2">
-            <a:extLst>
-              <a:ext uri="{FF2B5EF4-FFF2-40B4-BE49-F238E27FC236}">
-                <a16:creationId xmlns:a16="http://schemas.microsoft.com/office/drawing/2014/main" id="{F39A5086-367E-AC4F-AE4B-B4B03B915045}"/>
-              </a:ext>
-            </a:extLst>
-          </p:cNvPr>
+            <a:endParaRPr lang="en-US" dirty="0"/>
+          </a:p>
+        </p:txBody>
+      </p:sp>
+      <p:sp>
+        <p:nvSpPr>
+          <p:cNvPr id="3" name="Vertical Text Placeholder 2"/>
           <p:cNvSpPr>
             <a:spLocks noGrp="1"/>
           </p:cNvSpPr>
@@ -593,8 +531,8 @@
         </p:nvSpPr>
         <p:spPr>
           <a:xfrm>
-            <a:off x="838200" y="365125"/>
-            <a:ext cx="7734300" cy="5811838"/>
+            <a:off x="597218" y="365125"/>
+            <a:ext cx="5510689" cy="5811838"/>
           </a:xfrm>
         </p:spPr>
         <p:txBody>
@@ -634,18 +572,13 @@
               <a:rPr lang="en-US"/>
               <a:t>Fifth level</a:t>
             </a:r>
-          </a:p>
-        </p:txBody>
-      </p:sp>
-      <p:sp>
-        <p:nvSpPr>
-          <p:cNvPr id="4" name="Date Placeholder 3">
-            <a:extLst>
-              <a:ext uri="{FF2B5EF4-FFF2-40B4-BE49-F238E27FC236}">
-                <a16:creationId xmlns:a16="http://schemas.microsoft.com/office/drawing/2014/main" id="{383B0D06-CD1B-F041-B950-664235525F45}"/>
-              </a:ext>
-            </a:extLst>
-          </p:cNvPr>
+            <a:endParaRPr lang="en-US" dirty="0"/>
+          </a:p>
+        </p:txBody>
+      </p:sp>
+      <p:sp>
+        <p:nvSpPr>
+          <p:cNvPr id="4" name="Date Placeholder 3"/>
           <p:cNvSpPr>
             <a:spLocks noGrp="1"/>
           </p:cNvSpPr>
@@ -660,7 +593,7 @@
           <a:p>
             <a:fld id="{0F363A7F-1990-1A42-83C2-334856CEA27B}" type="datetimeFigureOut">
               <a:rPr lang="en-US" smtClean="0"/>
-              <a:t>1/13/22</a:t>
+              <a:t>2/25/22</a:t>
             </a:fld>
             <a:endParaRPr lang="en-US"/>
           </a:p>
@@ -668,13 +601,7 @@
       </p:sp>
       <p:sp>
         <p:nvSpPr>
-          <p:cNvPr id="5" name="Footer Placeholder 4">
-            <a:extLst>
-              <a:ext uri="{FF2B5EF4-FFF2-40B4-BE49-F238E27FC236}">
-                <a16:creationId xmlns:a16="http://schemas.microsoft.com/office/drawing/2014/main" id="{50F471E9-E987-0747-8A41-18E937013486}"/>
-              </a:ext>
-            </a:extLst>
-          </p:cNvPr>
+          <p:cNvPr id="5" name="Footer Placeholder 4"/>
           <p:cNvSpPr>
             <a:spLocks noGrp="1"/>
           </p:cNvSpPr>
@@ -693,13 +620,7 @@
       </p:sp>
       <p:sp>
         <p:nvSpPr>
-          <p:cNvPr id="6" name="Slide Number Placeholder 5">
-            <a:extLst>
-              <a:ext uri="{FF2B5EF4-FFF2-40B4-BE49-F238E27FC236}">
-                <a16:creationId xmlns:a16="http://schemas.microsoft.com/office/drawing/2014/main" id="{7CA2B7B8-7FD4-A647-AE02-00E8A3021CC6}"/>
-              </a:ext>
-            </a:extLst>
-          </p:cNvPr>
+          <p:cNvPr id="6" name="Slide Number Placeholder 5"/>
           <p:cNvSpPr>
             <a:spLocks noGrp="1"/>
           </p:cNvSpPr>
@@ -723,7 +644,7 @@
     </p:spTree>
     <p:extLst>
       <p:ext uri="{BB962C8B-B14F-4D97-AF65-F5344CB8AC3E}">
-        <p14:creationId xmlns:p14="http://schemas.microsoft.com/office/powerpoint/2010/main" val="2088496148"/>
+        <p14:creationId xmlns:p14="http://schemas.microsoft.com/office/powerpoint/2010/main" val="82455203"/>
       </p:ext>
     </p:extLst>
   </p:cSld>
@@ -752,13 +673,7 @@
       </p:grpSpPr>
       <p:sp>
         <p:nvSpPr>
-          <p:cNvPr id="2" name="Title 1">
-            <a:extLst>
-              <a:ext uri="{FF2B5EF4-FFF2-40B4-BE49-F238E27FC236}">
-                <a16:creationId xmlns:a16="http://schemas.microsoft.com/office/drawing/2014/main" id="{2EB422E4-A6B0-8341-A0DE-09DC59E191FC}"/>
-              </a:ext>
-            </a:extLst>
-          </p:cNvPr>
+          <p:cNvPr id="2" name="Title 1"/>
           <p:cNvSpPr>
             <a:spLocks noGrp="1"/>
           </p:cNvSpPr>
@@ -775,18 +690,13 @@
               <a:rPr lang="en-US"/>
               <a:t>Click to edit Master title style</a:t>
             </a:r>
-          </a:p>
-        </p:txBody>
-      </p:sp>
-      <p:sp>
-        <p:nvSpPr>
-          <p:cNvPr id="3" name="Content Placeholder 2">
-            <a:extLst>
-              <a:ext uri="{FF2B5EF4-FFF2-40B4-BE49-F238E27FC236}">
-                <a16:creationId xmlns:a16="http://schemas.microsoft.com/office/drawing/2014/main" id="{481A8D6A-31C8-DD46-8732-271396796508}"/>
-              </a:ext>
-            </a:extLst>
-          </p:cNvPr>
+            <a:endParaRPr lang="en-US" dirty="0"/>
+          </a:p>
+        </p:txBody>
+      </p:sp>
+      <p:sp>
+        <p:nvSpPr>
+          <p:cNvPr id="3" name="Content Placeholder 2"/>
           <p:cNvSpPr>
             <a:spLocks noGrp="1"/>
           </p:cNvSpPr>
@@ -832,18 +742,13 @@
               <a:rPr lang="en-US"/>
               <a:t>Fifth level</a:t>
             </a:r>
-          </a:p>
-        </p:txBody>
-      </p:sp>
-      <p:sp>
-        <p:nvSpPr>
-          <p:cNvPr id="4" name="Date Placeholder 3">
-            <a:extLst>
-              <a:ext uri="{FF2B5EF4-FFF2-40B4-BE49-F238E27FC236}">
-                <a16:creationId xmlns:a16="http://schemas.microsoft.com/office/drawing/2014/main" id="{9A1D4F00-A9D9-BE4E-8856-20E094AFD789}"/>
-              </a:ext>
-            </a:extLst>
-          </p:cNvPr>
+            <a:endParaRPr lang="en-US" dirty="0"/>
+          </a:p>
+        </p:txBody>
+      </p:sp>
+      <p:sp>
+        <p:nvSpPr>
+          <p:cNvPr id="4" name="Date Placeholder 3"/>
           <p:cNvSpPr>
             <a:spLocks noGrp="1"/>
           </p:cNvSpPr>
@@ -858,7 +763,7 @@
           <a:p>
             <a:fld id="{0F363A7F-1990-1A42-83C2-334856CEA27B}" type="datetimeFigureOut">
               <a:rPr lang="en-US" smtClean="0"/>
-              <a:t>1/13/22</a:t>
+              <a:t>2/25/22</a:t>
             </a:fld>
             <a:endParaRPr lang="en-US"/>
           </a:p>
@@ -866,13 +771,7 @@
       </p:sp>
       <p:sp>
         <p:nvSpPr>
-          <p:cNvPr id="5" name="Footer Placeholder 4">
-            <a:extLst>
-              <a:ext uri="{FF2B5EF4-FFF2-40B4-BE49-F238E27FC236}">
-                <a16:creationId xmlns:a16="http://schemas.microsoft.com/office/drawing/2014/main" id="{3693FE5C-2237-3F46-B9B0-A78CE2800ABF}"/>
-              </a:ext>
-            </a:extLst>
-          </p:cNvPr>
+          <p:cNvPr id="5" name="Footer Placeholder 4"/>
           <p:cNvSpPr>
             <a:spLocks noGrp="1"/>
           </p:cNvSpPr>
@@ -891,13 +790,7 @@
       </p:sp>
       <p:sp>
         <p:nvSpPr>
-          <p:cNvPr id="6" name="Slide Number Placeholder 5">
-            <a:extLst>
-              <a:ext uri="{FF2B5EF4-FFF2-40B4-BE49-F238E27FC236}">
-                <a16:creationId xmlns:a16="http://schemas.microsoft.com/office/drawing/2014/main" id="{86FB05FE-DE39-7E40-B2EA-F35BE4DF14FA}"/>
-              </a:ext>
-            </a:extLst>
-          </p:cNvPr>
+          <p:cNvPr id="6" name="Slide Number Placeholder 5"/>
           <p:cNvSpPr>
             <a:spLocks noGrp="1"/>
           </p:cNvSpPr>
@@ -921,7 +814,7 @@
     </p:spTree>
     <p:extLst>
       <p:ext uri="{BB962C8B-B14F-4D97-AF65-F5344CB8AC3E}">
-        <p14:creationId xmlns:p14="http://schemas.microsoft.com/office/powerpoint/2010/main" val="965516320"/>
+        <p14:creationId xmlns:p14="http://schemas.microsoft.com/office/powerpoint/2010/main" val="3129703984"/>
       </p:ext>
     </p:extLst>
   </p:cSld>
@@ -950,13 +843,7 @@
       </p:grpSpPr>
       <p:sp>
         <p:nvSpPr>
-          <p:cNvPr id="2" name="Title 1">
-            <a:extLst>
-              <a:ext uri="{FF2B5EF4-FFF2-40B4-BE49-F238E27FC236}">
-                <a16:creationId xmlns:a16="http://schemas.microsoft.com/office/drawing/2014/main" id="{BA33CE65-C095-5C4A-AFB7-668A4E9A297D}"/>
-              </a:ext>
-            </a:extLst>
-          </p:cNvPr>
+          <p:cNvPr id="2" name="Title 1"/>
           <p:cNvSpPr>
             <a:spLocks noGrp="1"/>
           </p:cNvSpPr>
@@ -966,15 +853,15 @@
         </p:nvSpPr>
         <p:spPr>
           <a:xfrm>
-            <a:off x="831850" y="1709738"/>
-            <a:ext cx="10515600" cy="2852737"/>
+            <a:off x="592694" y="1709740"/>
+            <a:ext cx="7492365" cy="2852737"/>
           </a:xfrm>
         </p:spPr>
         <p:txBody>
           <a:bodyPr anchor="b"/>
           <a:lstStyle>
             <a:lvl1pPr>
-              <a:defRPr sz="6000"/>
+              <a:defRPr sz="5700"/>
             </a:lvl1pPr>
           </a:lstStyle>
           <a:p>
@@ -982,18 +869,13 @@
               <a:rPr lang="en-US"/>
               <a:t>Click to edit Master title style</a:t>
             </a:r>
-          </a:p>
-        </p:txBody>
-      </p:sp>
-      <p:sp>
-        <p:nvSpPr>
-          <p:cNvPr id="3" name="Text Placeholder 2">
-            <a:extLst>
-              <a:ext uri="{FF2B5EF4-FFF2-40B4-BE49-F238E27FC236}">
-                <a16:creationId xmlns:a16="http://schemas.microsoft.com/office/drawing/2014/main" id="{A9C3F0D4-B139-0844-A497-70BD1DBEE085}"/>
-              </a:ext>
-            </a:extLst>
-          </p:cNvPr>
+            <a:endParaRPr lang="en-US" dirty="0"/>
+          </a:p>
+        </p:txBody>
+      </p:sp>
+      <p:sp>
+        <p:nvSpPr>
+          <p:cNvPr id="3" name="Text Placeholder 2"/>
           <p:cNvSpPr>
             <a:spLocks noGrp="1"/>
           </p:cNvSpPr>
@@ -1003,8 +885,8 @@
         </p:nvSpPr>
         <p:spPr>
           <a:xfrm>
-            <a:off x="831850" y="4589463"/>
-            <a:ext cx="10515600" cy="1500187"/>
+            <a:off x="592694" y="4589465"/>
+            <a:ext cx="7492365" cy="1500187"/>
           </a:xfrm>
         </p:spPr>
         <p:txBody>
@@ -1012,17 +894,15 @@
           <a:lstStyle>
             <a:lvl1pPr marL="0" indent="0">
               <a:buNone/>
-              <a:defRPr sz="2400">
+              <a:defRPr sz="2280">
                 <a:solidFill>
-                  <a:schemeClr val="tx1">
-                    <a:tint val="75000"/>
-                  </a:schemeClr>
+                  <a:schemeClr val="tx1"/>
                 </a:solidFill>
               </a:defRPr>
             </a:lvl1pPr>
-            <a:lvl2pPr marL="457200" indent="0">
-              <a:buNone/>
-              <a:defRPr sz="2000">
+            <a:lvl2pPr marL="434340" indent="0">
+              <a:buNone/>
+              <a:defRPr sz="1900">
                 <a:solidFill>
                   <a:schemeClr val="tx1">
                     <a:tint val="75000"/>
@@ -1030,9 +910,9 @@
                 </a:solidFill>
               </a:defRPr>
             </a:lvl2pPr>
-            <a:lvl3pPr marL="914400" indent="0">
-              <a:buNone/>
-              <a:defRPr sz="1800">
+            <a:lvl3pPr marL="868680" indent="0">
+              <a:buNone/>
+              <a:defRPr sz="1710">
                 <a:solidFill>
                   <a:schemeClr val="tx1">
                     <a:tint val="75000"/>
@@ -1040,9 +920,9 @@
                 </a:solidFill>
               </a:defRPr>
             </a:lvl3pPr>
-            <a:lvl4pPr marL="1371600" indent="0">
-              <a:buNone/>
-              <a:defRPr sz="1600">
+            <a:lvl4pPr marL="1303020" indent="0">
+              <a:buNone/>
+              <a:defRPr sz="1520">
                 <a:solidFill>
                   <a:schemeClr val="tx1">
                     <a:tint val="75000"/>
@@ -1050,9 +930,9 @@
                 </a:solidFill>
               </a:defRPr>
             </a:lvl4pPr>
-            <a:lvl5pPr marL="1828800" indent="0">
-              <a:buNone/>
-              <a:defRPr sz="1600">
+            <a:lvl5pPr marL="1737360" indent="0">
+              <a:buNone/>
+              <a:defRPr sz="1520">
                 <a:solidFill>
                   <a:schemeClr val="tx1">
                     <a:tint val="75000"/>
@@ -1060,9 +940,9 @@
                 </a:solidFill>
               </a:defRPr>
             </a:lvl5pPr>
-            <a:lvl6pPr marL="2286000" indent="0">
-              <a:buNone/>
-              <a:defRPr sz="1600">
+            <a:lvl6pPr marL="2171700" indent="0">
+              <a:buNone/>
+              <a:defRPr sz="1520">
                 <a:solidFill>
                   <a:schemeClr val="tx1">
                     <a:tint val="75000"/>
@@ -1070,9 +950,9 @@
                 </a:solidFill>
               </a:defRPr>
             </a:lvl6pPr>
-            <a:lvl7pPr marL="2743200" indent="0">
-              <a:buNone/>
-              <a:defRPr sz="1600">
+            <a:lvl7pPr marL="2606040" indent="0">
+              <a:buNone/>
+              <a:defRPr sz="1520">
                 <a:solidFill>
                   <a:schemeClr val="tx1">
                     <a:tint val="75000"/>
@@ -1080,9 +960,9 @@
                 </a:solidFill>
               </a:defRPr>
             </a:lvl7pPr>
-            <a:lvl8pPr marL="3200400" indent="0">
-              <a:buNone/>
-              <a:defRPr sz="1600">
+            <a:lvl8pPr marL="3040380" indent="0">
+              <a:buNone/>
+              <a:defRPr sz="1520">
                 <a:solidFill>
                   <a:schemeClr val="tx1">
                     <a:tint val="75000"/>
@@ -1090,9 +970,9 @@
                 </a:solidFill>
               </a:defRPr>
             </a:lvl8pPr>
-            <a:lvl9pPr marL="3657600" indent="0">
-              <a:buNone/>
-              <a:defRPr sz="1600">
+            <a:lvl9pPr marL="3474720" indent="0">
+              <a:buNone/>
+              <a:defRPr sz="1520">
                 <a:solidFill>
                   <a:schemeClr val="tx1">
                     <a:tint val="75000"/>
@@ -1112,13 +992,7 @@
       </p:sp>
       <p:sp>
         <p:nvSpPr>
-          <p:cNvPr id="4" name="Date Placeholder 3">
-            <a:extLst>
-              <a:ext uri="{FF2B5EF4-FFF2-40B4-BE49-F238E27FC236}">
-                <a16:creationId xmlns:a16="http://schemas.microsoft.com/office/drawing/2014/main" id="{7BED7466-B58D-9B4F-B2A3-49A7E058D18E}"/>
-              </a:ext>
-            </a:extLst>
-          </p:cNvPr>
+          <p:cNvPr id="4" name="Date Placeholder 3"/>
           <p:cNvSpPr>
             <a:spLocks noGrp="1"/>
           </p:cNvSpPr>
@@ -1133,7 +1007,7 @@
           <a:p>
             <a:fld id="{0F363A7F-1990-1A42-83C2-334856CEA27B}" type="datetimeFigureOut">
               <a:rPr lang="en-US" smtClean="0"/>
-              <a:t>1/13/22</a:t>
+              <a:t>2/25/22</a:t>
             </a:fld>
             <a:endParaRPr lang="en-US"/>
           </a:p>
@@ -1141,13 +1015,7 @@
       </p:sp>
       <p:sp>
         <p:nvSpPr>
-          <p:cNvPr id="5" name="Footer Placeholder 4">
-            <a:extLst>
-              <a:ext uri="{FF2B5EF4-FFF2-40B4-BE49-F238E27FC236}">
-                <a16:creationId xmlns:a16="http://schemas.microsoft.com/office/drawing/2014/main" id="{484AB9E1-3DA3-D647-B66D-BA49E21A9645}"/>
-              </a:ext>
-            </a:extLst>
-          </p:cNvPr>
+          <p:cNvPr id="5" name="Footer Placeholder 4"/>
           <p:cNvSpPr>
             <a:spLocks noGrp="1"/>
           </p:cNvSpPr>
@@ -1166,13 +1034,7 @@
       </p:sp>
       <p:sp>
         <p:nvSpPr>
-          <p:cNvPr id="6" name="Slide Number Placeholder 5">
-            <a:extLst>
-              <a:ext uri="{FF2B5EF4-FFF2-40B4-BE49-F238E27FC236}">
-                <a16:creationId xmlns:a16="http://schemas.microsoft.com/office/drawing/2014/main" id="{3F4B9054-227E-0143-A4B8-C76088565AA4}"/>
-              </a:ext>
-            </a:extLst>
-          </p:cNvPr>
+          <p:cNvPr id="6" name="Slide Number Placeholder 5"/>
           <p:cNvSpPr>
             <a:spLocks noGrp="1"/>
           </p:cNvSpPr>
@@ -1196,7 +1058,7 @@
     </p:spTree>
     <p:extLst>
       <p:ext uri="{BB962C8B-B14F-4D97-AF65-F5344CB8AC3E}">
-        <p14:creationId xmlns:p14="http://schemas.microsoft.com/office/powerpoint/2010/main" val="4284116741"/>
+        <p14:creationId xmlns:p14="http://schemas.microsoft.com/office/powerpoint/2010/main" val="4079486150"/>
       </p:ext>
     </p:extLst>
   </p:cSld>
@@ -1225,13 +1087,7 @@
       </p:grpSpPr>
       <p:sp>
         <p:nvSpPr>
-          <p:cNvPr id="2" name="Title 1">
-            <a:extLst>
-              <a:ext uri="{FF2B5EF4-FFF2-40B4-BE49-F238E27FC236}">
-                <a16:creationId xmlns:a16="http://schemas.microsoft.com/office/drawing/2014/main" id="{6CB02457-8455-474E-A63F-96D4845DE55F}"/>
-              </a:ext>
-            </a:extLst>
-          </p:cNvPr>
+          <p:cNvPr id="2" name="Title 1"/>
           <p:cNvSpPr>
             <a:spLocks noGrp="1"/>
           </p:cNvSpPr>
@@ -1248,18 +1104,13 @@
               <a:rPr lang="en-US"/>
               <a:t>Click to edit Master title style</a:t>
             </a:r>
-          </a:p>
-        </p:txBody>
-      </p:sp>
-      <p:sp>
-        <p:nvSpPr>
-          <p:cNvPr id="3" name="Content Placeholder 2">
-            <a:extLst>
-              <a:ext uri="{FF2B5EF4-FFF2-40B4-BE49-F238E27FC236}">
-                <a16:creationId xmlns:a16="http://schemas.microsoft.com/office/drawing/2014/main" id="{8EA06645-097F-664E-91B3-2704DCEE952C}"/>
-              </a:ext>
-            </a:extLst>
-          </p:cNvPr>
+            <a:endParaRPr lang="en-US" dirty="0"/>
+          </a:p>
+        </p:txBody>
+      </p:sp>
+      <p:sp>
+        <p:nvSpPr>
+          <p:cNvPr id="3" name="Content Placeholder 2"/>
           <p:cNvSpPr>
             <a:spLocks noGrp="1"/>
           </p:cNvSpPr>
@@ -1269,8 +1120,8 @@
         </p:nvSpPr>
         <p:spPr>
           <a:xfrm>
-            <a:off x="838200" y="1825625"/>
-            <a:ext cx="5181600" cy="4351338"/>
+            <a:off x="597218" y="1825625"/>
+            <a:ext cx="3691890" cy="4351338"/>
           </a:xfrm>
         </p:spPr>
         <p:txBody>
@@ -1310,18 +1161,13 @@
               <a:rPr lang="en-US"/>
               <a:t>Fifth level</a:t>
             </a:r>
-          </a:p>
-        </p:txBody>
-      </p:sp>
-      <p:sp>
-        <p:nvSpPr>
-          <p:cNvPr id="4" name="Content Placeholder 3">
-            <a:extLst>
-              <a:ext uri="{FF2B5EF4-FFF2-40B4-BE49-F238E27FC236}">
-                <a16:creationId xmlns:a16="http://schemas.microsoft.com/office/drawing/2014/main" id="{222E5E85-869E-D541-9413-963677AA70DF}"/>
-              </a:ext>
-            </a:extLst>
-          </p:cNvPr>
+            <a:endParaRPr lang="en-US" dirty="0"/>
+          </a:p>
+        </p:txBody>
+      </p:sp>
+      <p:sp>
+        <p:nvSpPr>
+          <p:cNvPr id="4" name="Content Placeholder 3"/>
           <p:cNvSpPr>
             <a:spLocks noGrp="1"/>
           </p:cNvSpPr>
@@ -1331,8 +1177,8 @@
         </p:nvSpPr>
         <p:spPr>
           <a:xfrm>
-            <a:off x="6172200" y="1825625"/>
-            <a:ext cx="5181600" cy="4351338"/>
+            <a:off x="4397693" y="1825625"/>
+            <a:ext cx="3691890" cy="4351338"/>
           </a:xfrm>
         </p:spPr>
         <p:txBody>
@@ -1372,18 +1218,13 @@
               <a:rPr lang="en-US"/>
               <a:t>Fifth level</a:t>
             </a:r>
-          </a:p>
-        </p:txBody>
-      </p:sp>
-      <p:sp>
-        <p:nvSpPr>
-          <p:cNvPr id="5" name="Date Placeholder 4">
-            <a:extLst>
-              <a:ext uri="{FF2B5EF4-FFF2-40B4-BE49-F238E27FC236}">
-                <a16:creationId xmlns:a16="http://schemas.microsoft.com/office/drawing/2014/main" id="{9BBFFCC8-851E-B74E-8643-45A3DCC1C7F6}"/>
-              </a:ext>
-            </a:extLst>
-          </p:cNvPr>
+            <a:endParaRPr lang="en-US" dirty="0"/>
+          </a:p>
+        </p:txBody>
+      </p:sp>
+      <p:sp>
+        <p:nvSpPr>
+          <p:cNvPr id="5" name="Date Placeholder 4"/>
           <p:cNvSpPr>
             <a:spLocks noGrp="1"/>
           </p:cNvSpPr>
@@ -1398,7 +1239,7 @@
           <a:p>
             <a:fld id="{0F363A7F-1990-1A42-83C2-334856CEA27B}" type="datetimeFigureOut">
               <a:rPr lang="en-US" smtClean="0"/>
-              <a:t>1/13/22</a:t>
+              <a:t>2/25/22</a:t>
             </a:fld>
             <a:endParaRPr lang="en-US"/>
           </a:p>
@@ -1406,13 +1247,7 @@
       </p:sp>
       <p:sp>
         <p:nvSpPr>
-          <p:cNvPr id="6" name="Footer Placeholder 5">
-            <a:extLst>
-              <a:ext uri="{FF2B5EF4-FFF2-40B4-BE49-F238E27FC236}">
-                <a16:creationId xmlns:a16="http://schemas.microsoft.com/office/drawing/2014/main" id="{6A90DB97-4343-B745-BD4B-BD01901D49BD}"/>
-              </a:ext>
-            </a:extLst>
-          </p:cNvPr>
+          <p:cNvPr id="6" name="Footer Placeholder 5"/>
           <p:cNvSpPr>
             <a:spLocks noGrp="1"/>
           </p:cNvSpPr>
@@ -1431,13 +1266,7 @@
       </p:sp>
       <p:sp>
         <p:nvSpPr>
-          <p:cNvPr id="7" name="Slide Number Placeholder 6">
-            <a:extLst>
-              <a:ext uri="{FF2B5EF4-FFF2-40B4-BE49-F238E27FC236}">
-                <a16:creationId xmlns:a16="http://schemas.microsoft.com/office/drawing/2014/main" id="{6FCD956A-D267-E247-907E-A4E0B0E631BD}"/>
-              </a:ext>
-            </a:extLst>
-          </p:cNvPr>
+          <p:cNvPr id="7" name="Slide Number Placeholder 6"/>
           <p:cNvSpPr>
             <a:spLocks noGrp="1"/>
           </p:cNvSpPr>
@@ -1461,7 +1290,7 @@
     </p:spTree>
     <p:extLst>
       <p:ext uri="{BB962C8B-B14F-4D97-AF65-F5344CB8AC3E}">
-        <p14:creationId xmlns:p14="http://schemas.microsoft.com/office/powerpoint/2010/main" val="3985005906"/>
+        <p14:creationId xmlns:p14="http://schemas.microsoft.com/office/powerpoint/2010/main" val="2684462205"/>
       </p:ext>
     </p:extLst>
   </p:cSld>
@@ -1490,13 +1319,7 @@
       </p:grpSpPr>
       <p:sp>
         <p:nvSpPr>
-          <p:cNvPr id="2" name="Title 1">
-            <a:extLst>
-              <a:ext uri="{FF2B5EF4-FFF2-40B4-BE49-F238E27FC236}">
-                <a16:creationId xmlns:a16="http://schemas.microsoft.com/office/drawing/2014/main" id="{75C254E5-E138-F244-9F23-A467AE60910E}"/>
-              </a:ext>
-            </a:extLst>
-          </p:cNvPr>
+          <p:cNvPr id="2" name="Title 1"/>
           <p:cNvSpPr>
             <a:spLocks noGrp="1"/>
           </p:cNvSpPr>
@@ -1506,8 +1329,8 @@
         </p:nvSpPr>
         <p:spPr>
           <a:xfrm>
-            <a:off x="839788" y="365125"/>
-            <a:ext cx="10515600" cy="1325563"/>
+            <a:off x="598349" y="365127"/>
+            <a:ext cx="7492365" cy="1325563"/>
           </a:xfrm>
         </p:spPr>
         <p:txBody>
@@ -1518,18 +1341,13 @@
               <a:rPr lang="en-US"/>
               <a:t>Click to edit Master title style</a:t>
             </a:r>
-          </a:p>
-        </p:txBody>
-      </p:sp>
-      <p:sp>
-        <p:nvSpPr>
-          <p:cNvPr id="3" name="Text Placeholder 2">
-            <a:extLst>
-              <a:ext uri="{FF2B5EF4-FFF2-40B4-BE49-F238E27FC236}">
-                <a16:creationId xmlns:a16="http://schemas.microsoft.com/office/drawing/2014/main" id="{F3C4EA82-3602-3144-B89C-AC2681B77472}"/>
-              </a:ext>
-            </a:extLst>
-          </p:cNvPr>
+            <a:endParaRPr lang="en-US" dirty="0"/>
+          </a:p>
+        </p:txBody>
+      </p:sp>
+      <p:sp>
+        <p:nvSpPr>
+          <p:cNvPr id="3" name="Text Placeholder 2"/>
           <p:cNvSpPr>
             <a:spLocks noGrp="1"/>
           </p:cNvSpPr>
@@ -1539,8 +1357,8 @@
         </p:nvSpPr>
         <p:spPr>
           <a:xfrm>
-            <a:off x="839788" y="1681163"/>
-            <a:ext cx="5157787" cy="823912"/>
+            <a:off x="598350" y="1681163"/>
+            <a:ext cx="3674923" cy="823912"/>
           </a:xfrm>
         </p:spPr>
         <p:txBody>
@@ -1548,39 +1366,39 @@
           <a:lstStyle>
             <a:lvl1pPr marL="0" indent="0">
               <a:buNone/>
-              <a:defRPr sz="2400" b="1"/>
+              <a:defRPr sz="2280" b="1"/>
             </a:lvl1pPr>
-            <a:lvl2pPr marL="457200" indent="0">
-              <a:buNone/>
-              <a:defRPr sz="2000" b="1"/>
+            <a:lvl2pPr marL="434340" indent="0">
+              <a:buNone/>
+              <a:defRPr sz="1900" b="1"/>
             </a:lvl2pPr>
-            <a:lvl3pPr marL="914400" indent="0">
-              <a:buNone/>
-              <a:defRPr sz="1800" b="1"/>
+            <a:lvl3pPr marL="868680" indent="0">
+              <a:buNone/>
+              <a:defRPr sz="1710" b="1"/>
             </a:lvl3pPr>
-            <a:lvl4pPr marL="1371600" indent="0">
-              <a:buNone/>
-              <a:defRPr sz="1600" b="1"/>
+            <a:lvl4pPr marL="1303020" indent="0">
+              <a:buNone/>
+              <a:defRPr sz="1520" b="1"/>
             </a:lvl4pPr>
-            <a:lvl5pPr marL="1828800" indent="0">
-              <a:buNone/>
-              <a:defRPr sz="1600" b="1"/>
+            <a:lvl5pPr marL="1737360" indent="0">
+              <a:buNone/>
+              <a:defRPr sz="1520" b="1"/>
             </a:lvl5pPr>
-            <a:lvl6pPr marL="2286000" indent="0">
-              <a:buNone/>
-              <a:defRPr sz="1600" b="1"/>
+            <a:lvl6pPr marL="2171700" indent="0">
+              <a:buNone/>
+              <a:defRPr sz="1520" b="1"/>
             </a:lvl6pPr>
-            <a:lvl7pPr marL="2743200" indent="0">
-              <a:buNone/>
-              <a:defRPr sz="1600" b="1"/>
+            <a:lvl7pPr marL="2606040" indent="0">
+              <a:buNone/>
+              <a:defRPr sz="1520" b="1"/>
             </a:lvl7pPr>
-            <a:lvl8pPr marL="3200400" indent="0">
-              <a:buNone/>
-              <a:defRPr sz="1600" b="1"/>
+            <a:lvl8pPr marL="3040380" indent="0">
+              <a:buNone/>
+              <a:defRPr sz="1520" b="1"/>
             </a:lvl8pPr>
-            <a:lvl9pPr marL="3657600" indent="0">
-              <a:buNone/>
-              <a:defRPr sz="1600" b="1"/>
+            <a:lvl9pPr marL="3474720" indent="0">
+              <a:buNone/>
+              <a:defRPr sz="1520" b="1"/>
             </a:lvl9pPr>
           </a:lstStyle>
           <a:p>
@@ -1594,13 +1412,7 @@
       </p:sp>
       <p:sp>
         <p:nvSpPr>
-          <p:cNvPr id="4" name="Content Placeholder 3">
-            <a:extLst>
-              <a:ext uri="{FF2B5EF4-FFF2-40B4-BE49-F238E27FC236}">
-                <a16:creationId xmlns:a16="http://schemas.microsoft.com/office/drawing/2014/main" id="{5660C60C-AD57-474A-8D70-9C67C0A6DAA6}"/>
-              </a:ext>
-            </a:extLst>
-          </p:cNvPr>
+          <p:cNvPr id="4" name="Content Placeholder 3"/>
           <p:cNvSpPr>
             <a:spLocks noGrp="1"/>
           </p:cNvSpPr>
@@ -1610,8 +1422,8 @@
         </p:nvSpPr>
         <p:spPr>
           <a:xfrm>
-            <a:off x="839788" y="2505075"/>
-            <a:ext cx="5157787" cy="3684588"/>
+            <a:off x="598350" y="2505075"/>
+            <a:ext cx="3674923" cy="3684588"/>
           </a:xfrm>
         </p:spPr>
         <p:txBody>
@@ -1651,18 +1463,13 @@
               <a:rPr lang="en-US"/>
               <a:t>Fifth level</a:t>
             </a:r>
-          </a:p>
-        </p:txBody>
-      </p:sp>
-      <p:sp>
-        <p:nvSpPr>
-          <p:cNvPr id="5" name="Text Placeholder 4">
-            <a:extLst>
-              <a:ext uri="{FF2B5EF4-FFF2-40B4-BE49-F238E27FC236}">
-                <a16:creationId xmlns:a16="http://schemas.microsoft.com/office/drawing/2014/main" id="{46E4181F-3750-6B48-B6D6-54911A384FDD}"/>
-              </a:ext>
-            </a:extLst>
-          </p:cNvPr>
+            <a:endParaRPr lang="en-US" dirty="0"/>
+          </a:p>
+        </p:txBody>
+      </p:sp>
+      <p:sp>
+        <p:nvSpPr>
+          <p:cNvPr id="5" name="Text Placeholder 4"/>
           <p:cNvSpPr>
             <a:spLocks noGrp="1"/>
           </p:cNvSpPr>
@@ -1672,8 +1479,8 @@
         </p:nvSpPr>
         <p:spPr>
           <a:xfrm>
-            <a:off x="6172200" y="1681163"/>
-            <a:ext cx="5183188" cy="823912"/>
+            <a:off x="4397693" y="1681163"/>
+            <a:ext cx="3693021" cy="823912"/>
           </a:xfrm>
         </p:spPr>
         <p:txBody>
@@ -1681,39 +1488,39 @@
           <a:lstStyle>
             <a:lvl1pPr marL="0" indent="0">
               <a:buNone/>
-              <a:defRPr sz="2400" b="1"/>
+              <a:defRPr sz="2280" b="1"/>
             </a:lvl1pPr>
-            <a:lvl2pPr marL="457200" indent="0">
-              <a:buNone/>
-              <a:defRPr sz="2000" b="1"/>
+            <a:lvl2pPr marL="434340" indent="0">
+              <a:buNone/>
+              <a:defRPr sz="1900" b="1"/>
             </a:lvl2pPr>
-            <a:lvl3pPr marL="914400" indent="0">
-              <a:buNone/>
-              <a:defRPr sz="1800" b="1"/>
+            <a:lvl3pPr marL="868680" indent="0">
+              <a:buNone/>
+              <a:defRPr sz="1710" b="1"/>
             </a:lvl3pPr>
-            <a:lvl4pPr marL="1371600" indent="0">
-              <a:buNone/>
-              <a:defRPr sz="1600" b="1"/>
+            <a:lvl4pPr marL="1303020" indent="0">
+              <a:buNone/>
+              <a:defRPr sz="1520" b="1"/>
             </a:lvl4pPr>
-            <a:lvl5pPr marL="1828800" indent="0">
-              <a:buNone/>
-              <a:defRPr sz="1600" b="1"/>
+            <a:lvl5pPr marL="1737360" indent="0">
+              <a:buNone/>
+              <a:defRPr sz="1520" b="1"/>
             </a:lvl5pPr>
-            <a:lvl6pPr marL="2286000" indent="0">
-              <a:buNone/>
-              <a:defRPr sz="1600" b="1"/>
+            <a:lvl6pPr marL="2171700" indent="0">
+              <a:buNone/>
+              <a:defRPr sz="1520" b="1"/>
             </a:lvl6pPr>
-            <a:lvl7pPr marL="2743200" indent="0">
-              <a:buNone/>
-              <a:defRPr sz="1600" b="1"/>
+            <a:lvl7pPr marL="2606040" indent="0">
+              <a:buNone/>
+              <a:defRPr sz="1520" b="1"/>
             </a:lvl7pPr>
-            <a:lvl8pPr marL="3200400" indent="0">
-              <a:buNone/>
-              <a:defRPr sz="1600" b="1"/>
+            <a:lvl8pPr marL="3040380" indent="0">
+              <a:buNone/>
+              <a:defRPr sz="1520" b="1"/>
             </a:lvl8pPr>
-            <a:lvl9pPr marL="3657600" indent="0">
-              <a:buNone/>
-              <a:defRPr sz="1600" b="1"/>
+            <a:lvl9pPr marL="3474720" indent="0">
+              <a:buNone/>
+              <a:defRPr sz="1520" b="1"/>
             </a:lvl9pPr>
           </a:lstStyle>
           <a:p>
@@ -1727,13 +1534,7 @@
       </p:sp>
       <p:sp>
         <p:nvSpPr>
-          <p:cNvPr id="6" name="Content Placeholder 5">
-            <a:extLst>
-              <a:ext uri="{FF2B5EF4-FFF2-40B4-BE49-F238E27FC236}">
-                <a16:creationId xmlns:a16="http://schemas.microsoft.com/office/drawing/2014/main" id="{C09BF14E-BAB3-C346-ACA7-CA33E9641389}"/>
-              </a:ext>
-            </a:extLst>
-          </p:cNvPr>
+          <p:cNvPr id="6" name="Content Placeholder 5"/>
           <p:cNvSpPr>
             <a:spLocks noGrp="1"/>
           </p:cNvSpPr>
@@ -1743,8 +1544,8 @@
         </p:nvSpPr>
         <p:spPr>
           <a:xfrm>
-            <a:off x="6172200" y="2505075"/>
-            <a:ext cx="5183188" cy="3684588"/>
+            <a:off x="4397693" y="2505075"/>
+            <a:ext cx="3693021" cy="3684588"/>
           </a:xfrm>
         </p:spPr>
         <p:txBody>
@@ -1784,18 +1585,13 @@
               <a:rPr lang="en-US"/>
               <a:t>Fifth level</a:t>
             </a:r>
-          </a:p>
-        </p:txBody>
-      </p:sp>
-      <p:sp>
-        <p:nvSpPr>
-          <p:cNvPr id="7" name="Date Placeholder 6">
-            <a:extLst>
-              <a:ext uri="{FF2B5EF4-FFF2-40B4-BE49-F238E27FC236}">
-                <a16:creationId xmlns:a16="http://schemas.microsoft.com/office/drawing/2014/main" id="{CC024E7E-773D-CC40-A66E-991082FABFD0}"/>
-              </a:ext>
-            </a:extLst>
-          </p:cNvPr>
+            <a:endParaRPr lang="en-US" dirty="0"/>
+          </a:p>
+        </p:txBody>
+      </p:sp>
+      <p:sp>
+        <p:nvSpPr>
+          <p:cNvPr id="7" name="Date Placeholder 6"/>
           <p:cNvSpPr>
             <a:spLocks noGrp="1"/>
           </p:cNvSpPr>
@@ -1810,7 +1606,7 @@
           <a:p>
             <a:fld id="{0F363A7F-1990-1A42-83C2-334856CEA27B}" type="datetimeFigureOut">
               <a:rPr lang="en-US" smtClean="0"/>
-              <a:t>1/13/22</a:t>
+              <a:t>2/25/22</a:t>
             </a:fld>
             <a:endParaRPr lang="en-US"/>
           </a:p>
@@ -1818,13 +1614,7 @@
       </p:sp>
       <p:sp>
         <p:nvSpPr>
-          <p:cNvPr id="8" name="Footer Placeholder 7">
-            <a:extLst>
-              <a:ext uri="{FF2B5EF4-FFF2-40B4-BE49-F238E27FC236}">
-                <a16:creationId xmlns:a16="http://schemas.microsoft.com/office/drawing/2014/main" id="{4C718B46-5ED5-E84A-BA4C-78EA04FE757A}"/>
-              </a:ext>
-            </a:extLst>
-          </p:cNvPr>
+          <p:cNvPr id="8" name="Footer Placeholder 7"/>
           <p:cNvSpPr>
             <a:spLocks noGrp="1"/>
           </p:cNvSpPr>
@@ -1843,13 +1633,7 @@
       </p:sp>
       <p:sp>
         <p:nvSpPr>
-          <p:cNvPr id="9" name="Slide Number Placeholder 8">
-            <a:extLst>
-              <a:ext uri="{FF2B5EF4-FFF2-40B4-BE49-F238E27FC236}">
-                <a16:creationId xmlns:a16="http://schemas.microsoft.com/office/drawing/2014/main" id="{1F544D85-414B-3E4B-B46B-026E6C0547CF}"/>
-              </a:ext>
-            </a:extLst>
-          </p:cNvPr>
+          <p:cNvPr id="9" name="Slide Number Placeholder 8"/>
           <p:cNvSpPr>
             <a:spLocks noGrp="1"/>
           </p:cNvSpPr>
@@ -1873,7 +1657,7 @@
     </p:spTree>
     <p:extLst>
       <p:ext uri="{BB962C8B-B14F-4D97-AF65-F5344CB8AC3E}">
-        <p14:creationId xmlns:p14="http://schemas.microsoft.com/office/powerpoint/2010/main" val="1839514559"/>
+        <p14:creationId xmlns:p14="http://schemas.microsoft.com/office/powerpoint/2010/main" val="323685179"/>
       </p:ext>
     </p:extLst>
   </p:cSld>
@@ -1902,13 +1686,7 @@
       </p:grpSpPr>
       <p:sp>
         <p:nvSpPr>
-          <p:cNvPr id="2" name="Title 1">
-            <a:extLst>
-              <a:ext uri="{FF2B5EF4-FFF2-40B4-BE49-F238E27FC236}">
-                <a16:creationId xmlns:a16="http://schemas.microsoft.com/office/drawing/2014/main" id="{4AA2CF5F-8302-5845-8595-AD16E55B8BF7}"/>
-              </a:ext>
-            </a:extLst>
-          </p:cNvPr>
+          <p:cNvPr id="2" name="Title 1"/>
           <p:cNvSpPr>
             <a:spLocks noGrp="1"/>
           </p:cNvSpPr>
@@ -1925,18 +1703,13 @@
               <a:rPr lang="en-US"/>
               <a:t>Click to edit Master title style</a:t>
             </a:r>
-          </a:p>
-        </p:txBody>
-      </p:sp>
-      <p:sp>
-        <p:nvSpPr>
-          <p:cNvPr id="3" name="Date Placeholder 2">
-            <a:extLst>
-              <a:ext uri="{FF2B5EF4-FFF2-40B4-BE49-F238E27FC236}">
-                <a16:creationId xmlns:a16="http://schemas.microsoft.com/office/drawing/2014/main" id="{9BCF7F67-877E-7A45-BE69-5CF0947CA8BD}"/>
-              </a:ext>
-            </a:extLst>
-          </p:cNvPr>
+            <a:endParaRPr lang="en-US" dirty="0"/>
+          </a:p>
+        </p:txBody>
+      </p:sp>
+      <p:sp>
+        <p:nvSpPr>
+          <p:cNvPr id="3" name="Date Placeholder 2"/>
           <p:cNvSpPr>
             <a:spLocks noGrp="1"/>
           </p:cNvSpPr>
@@ -1951,7 +1724,7 @@
           <a:p>
             <a:fld id="{0F363A7F-1990-1A42-83C2-334856CEA27B}" type="datetimeFigureOut">
               <a:rPr lang="en-US" smtClean="0"/>
-              <a:t>1/13/22</a:t>
+              <a:t>2/25/22</a:t>
             </a:fld>
             <a:endParaRPr lang="en-US"/>
           </a:p>
@@ -1959,13 +1732,7 @@
       </p:sp>
       <p:sp>
         <p:nvSpPr>
-          <p:cNvPr id="4" name="Footer Placeholder 3">
-            <a:extLst>
-              <a:ext uri="{FF2B5EF4-FFF2-40B4-BE49-F238E27FC236}">
-                <a16:creationId xmlns:a16="http://schemas.microsoft.com/office/drawing/2014/main" id="{75E894FE-9F0A-7449-9F91-44F0A4367C6F}"/>
-              </a:ext>
-            </a:extLst>
-          </p:cNvPr>
+          <p:cNvPr id="4" name="Footer Placeholder 3"/>
           <p:cNvSpPr>
             <a:spLocks noGrp="1"/>
           </p:cNvSpPr>
@@ -1984,13 +1751,7 @@
       </p:sp>
       <p:sp>
         <p:nvSpPr>
-          <p:cNvPr id="5" name="Slide Number Placeholder 4">
-            <a:extLst>
-              <a:ext uri="{FF2B5EF4-FFF2-40B4-BE49-F238E27FC236}">
-                <a16:creationId xmlns:a16="http://schemas.microsoft.com/office/drawing/2014/main" id="{B9DC7BDA-BB83-C543-A7E5-C03C246497E5}"/>
-              </a:ext>
-            </a:extLst>
-          </p:cNvPr>
+          <p:cNvPr id="5" name="Slide Number Placeholder 4"/>
           <p:cNvSpPr>
             <a:spLocks noGrp="1"/>
           </p:cNvSpPr>
@@ -2014,7 +1775,7 @@
     </p:spTree>
     <p:extLst>
       <p:ext uri="{BB962C8B-B14F-4D97-AF65-F5344CB8AC3E}">
-        <p14:creationId xmlns:p14="http://schemas.microsoft.com/office/powerpoint/2010/main" val="3235643918"/>
+        <p14:creationId xmlns:p14="http://schemas.microsoft.com/office/powerpoint/2010/main" val="3129210348"/>
       </p:ext>
     </p:extLst>
   </p:cSld>
@@ -2043,13 +1804,7 @@
       </p:grpSpPr>
       <p:sp>
         <p:nvSpPr>
-          <p:cNvPr id="2" name="Date Placeholder 1">
-            <a:extLst>
-              <a:ext uri="{FF2B5EF4-FFF2-40B4-BE49-F238E27FC236}">
-                <a16:creationId xmlns:a16="http://schemas.microsoft.com/office/drawing/2014/main" id="{AAAE7679-45DA-5041-BF9B-781B333C6C5B}"/>
-              </a:ext>
-            </a:extLst>
-          </p:cNvPr>
+          <p:cNvPr id="2" name="Date Placeholder 1"/>
           <p:cNvSpPr>
             <a:spLocks noGrp="1"/>
           </p:cNvSpPr>
@@ -2064,7 +1819,7 @@
           <a:p>
             <a:fld id="{0F363A7F-1990-1A42-83C2-334856CEA27B}" type="datetimeFigureOut">
               <a:rPr lang="en-US" smtClean="0"/>
-              <a:t>1/13/22</a:t>
+              <a:t>2/25/22</a:t>
             </a:fld>
             <a:endParaRPr lang="en-US"/>
           </a:p>
@@ -2072,13 +1827,7 @@
       </p:sp>
       <p:sp>
         <p:nvSpPr>
-          <p:cNvPr id="3" name="Footer Placeholder 2">
-            <a:extLst>
-              <a:ext uri="{FF2B5EF4-FFF2-40B4-BE49-F238E27FC236}">
-                <a16:creationId xmlns:a16="http://schemas.microsoft.com/office/drawing/2014/main" id="{12D92BCC-41AF-6045-8E6D-289DDA2FD77D}"/>
-              </a:ext>
-            </a:extLst>
-          </p:cNvPr>
+          <p:cNvPr id="3" name="Footer Placeholder 2"/>
           <p:cNvSpPr>
             <a:spLocks noGrp="1"/>
           </p:cNvSpPr>
@@ -2097,13 +1846,7 @@
       </p:sp>
       <p:sp>
         <p:nvSpPr>
-          <p:cNvPr id="4" name="Slide Number Placeholder 3">
-            <a:extLst>
-              <a:ext uri="{FF2B5EF4-FFF2-40B4-BE49-F238E27FC236}">
-                <a16:creationId xmlns:a16="http://schemas.microsoft.com/office/drawing/2014/main" id="{A127DD15-A36A-EA4E-BEFC-6AFFB511DFD2}"/>
-              </a:ext>
-            </a:extLst>
-          </p:cNvPr>
+          <p:cNvPr id="4" name="Slide Number Placeholder 3"/>
           <p:cNvSpPr>
             <a:spLocks noGrp="1"/>
           </p:cNvSpPr>
@@ -2127,7 +1870,7 @@
     </p:spTree>
     <p:extLst>
       <p:ext uri="{BB962C8B-B14F-4D97-AF65-F5344CB8AC3E}">
-        <p14:creationId xmlns:p14="http://schemas.microsoft.com/office/powerpoint/2010/main" val="2190402184"/>
+        <p14:creationId xmlns:p14="http://schemas.microsoft.com/office/powerpoint/2010/main" val="107602899"/>
       </p:ext>
     </p:extLst>
   </p:cSld>
@@ -2156,13 +1899,7 @@
       </p:grpSpPr>
       <p:sp>
         <p:nvSpPr>
-          <p:cNvPr id="2" name="Title 1">
-            <a:extLst>
-              <a:ext uri="{FF2B5EF4-FFF2-40B4-BE49-F238E27FC236}">
-                <a16:creationId xmlns:a16="http://schemas.microsoft.com/office/drawing/2014/main" id="{BE278F92-2A16-8E41-AB5D-EC543EE0FF7A}"/>
-              </a:ext>
-            </a:extLst>
-          </p:cNvPr>
+          <p:cNvPr id="2" name="Title 1"/>
           <p:cNvSpPr>
             <a:spLocks noGrp="1"/>
           </p:cNvSpPr>
@@ -2172,15 +1909,15 @@
         </p:nvSpPr>
         <p:spPr>
           <a:xfrm>
-            <a:off x="839788" y="457200"/>
-            <a:ext cx="3932237" cy="1600200"/>
+            <a:off x="598349" y="457200"/>
+            <a:ext cx="2801719" cy="1600200"/>
           </a:xfrm>
         </p:spPr>
         <p:txBody>
           <a:bodyPr anchor="b"/>
           <a:lstStyle>
             <a:lvl1pPr>
-              <a:defRPr sz="3200"/>
+              <a:defRPr sz="3040"/>
             </a:lvl1pPr>
           </a:lstStyle>
           <a:p>
@@ -2188,18 +1925,13 @@
               <a:rPr lang="en-US"/>
               <a:t>Click to edit Master title style</a:t>
             </a:r>
-          </a:p>
-        </p:txBody>
-      </p:sp>
-      <p:sp>
-        <p:nvSpPr>
-          <p:cNvPr id="3" name="Content Placeholder 2">
-            <a:extLst>
-              <a:ext uri="{FF2B5EF4-FFF2-40B4-BE49-F238E27FC236}">
-                <a16:creationId xmlns:a16="http://schemas.microsoft.com/office/drawing/2014/main" id="{DD26B519-E965-4D48-AD77-8E9C48940FD7}"/>
-              </a:ext>
-            </a:extLst>
-          </p:cNvPr>
+            <a:endParaRPr lang="en-US" dirty="0"/>
+          </a:p>
+        </p:txBody>
+      </p:sp>
+      <p:sp>
+        <p:nvSpPr>
+          <p:cNvPr id="3" name="Content Placeholder 2"/>
           <p:cNvSpPr>
             <a:spLocks noGrp="1"/>
           </p:cNvSpPr>
@@ -2209,39 +1941,39 @@
         </p:nvSpPr>
         <p:spPr>
           <a:xfrm>
-            <a:off x="5183188" y="987425"/>
-            <a:ext cx="6172200" cy="4873625"/>
+            <a:off x="3693021" y="987427"/>
+            <a:ext cx="4397693" cy="4873625"/>
           </a:xfrm>
         </p:spPr>
         <p:txBody>
           <a:bodyPr/>
           <a:lstStyle>
             <a:lvl1pPr>
-              <a:defRPr sz="3200"/>
+              <a:defRPr sz="3040"/>
             </a:lvl1pPr>
             <a:lvl2pPr>
-              <a:defRPr sz="2800"/>
+              <a:defRPr sz="2660"/>
             </a:lvl2pPr>
             <a:lvl3pPr>
-              <a:defRPr sz="2400"/>
+              <a:defRPr sz="2280"/>
             </a:lvl3pPr>
             <a:lvl4pPr>
-              <a:defRPr sz="2000"/>
+              <a:defRPr sz="1900"/>
             </a:lvl4pPr>
             <a:lvl5pPr>
-              <a:defRPr sz="2000"/>
+              <a:defRPr sz="1900"/>
             </a:lvl5pPr>
             <a:lvl6pPr>
-              <a:defRPr sz="2000"/>
+              <a:defRPr sz="1900"/>
             </a:lvl6pPr>
             <a:lvl7pPr>
-              <a:defRPr sz="2000"/>
+              <a:defRPr sz="1900"/>
             </a:lvl7pPr>
             <a:lvl8pPr>
-              <a:defRPr sz="2000"/>
+              <a:defRPr sz="1900"/>
             </a:lvl8pPr>
             <a:lvl9pPr>
-              <a:defRPr sz="2000"/>
+              <a:defRPr sz="1900"/>
             </a:lvl9pPr>
           </a:lstStyle>
           <a:p>
@@ -2278,18 +2010,13 @@
               <a:rPr lang="en-US"/>
               <a:t>Fifth level</a:t>
             </a:r>
-          </a:p>
-        </p:txBody>
-      </p:sp>
-      <p:sp>
-        <p:nvSpPr>
-          <p:cNvPr id="4" name="Text Placeholder 3">
-            <a:extLst>
-              <a:ext uri="{FF2B5EF4-FFF2-40B4-BE49-F238E27FC236}">
-                <a16:creationId xmlns:a16="http://schemas.microsoft.com/office/drawing/2014/main" id="{089701DA-A9A9-B146-9A7D-9A04DF89ACA4}"/>
-              </a:ext>
-            </a:extLst>
-          </p:cNvPr>
+            <a:endParaRPr lang="en-US" dirty="0"/>
+          </a:p>
+        </p:txBody>
+      </p:sp>
+      <p:sp>
+        <p:nvSpPr>
+          <p:cNvPr id="4" name="Text Placeholder 3"/>
           <p:cNvSpPr>
             <a:spLocks noGrp="1"/>
           </p:cNvSpPr>
@@ -2299,8 +2026,8 @@
         </p:nvSpPr>
         <p:spPr>
           <a:xfrm>
-            <a:off x="839788" y="2057400"/>
-            <a:ext cx="3932237" cy="3811588"/>
+            <a:off x="598349" y="2057400"/>
+            <a:ext cx="2801719" cy="3811588"/>
           </a:xfrm>
         </p:spPr>
         <p:txBody>
@@ -2308,39 +2035,39 @@
           <a:lstStyle>
             <a:lvl1pPr marL="0" indent="0">
               <a:buNone/>
-              <a:defRPr sz="1600"/>
+              <a:defRPr sz="1520"/>
             </a:lvl1pPr>
-            <a:lvl2pPr marL="457200" indent="0">
-              <a:buNone/>
-              <a:defRPr sz="1400"/>
+            <a:lvl2pPr marL="434340" indent="0">
+              <a:buNone/>
+              <a:defRPr sz="1330"/>
             </a:lvl2pPr>
-            <a:lvl3pPr marL="914400" indent="0">
-              <a:buNone/>
-              <a:defRPr sz="1200"/>
+            <a:lvl3pPr marL="868680" indent="0">
+              <a:buNone/>
+              <a:defRPr sz="1140"/>
             </a:lvl3pPr>
-            <a:lvl4pPr marL="1371600" indent="0">
-              <a:buNone/>
-              <a:defRPr sz="1000"/>
+            <a:lvl4pPr marL="1303020" indent="0">
+              <a:buNone/>
+              <a:defRPr sz="950"/>
             </a:lvl4pPr>
-            <a:lvl5pPr marL="1828800" indent="0">
-              <a:buNone/>
-              <a:defRPr sz="1000"/>
+            <a:lvl5pPr marL="1737360" indent="0">
+              <a:buNone/>
+              <a:defRPr sz="950"/>
             </a:lvl5pPr>
-            <a:lvl6pPr marL="2286000" indent="0">
-              <a:buNone/>
-              <a:defRPr sz="1000"/>
+            <a:lvl6pPr marL="2171700" indent="0">
+              <a:buNone/>
+              <a:defRPr sz="950"/>
             </a:lvl6pPr>
-            <a:lvl7pPr marL="2743200" indent="0">
-              <a:buNone/>
-              <a:defRPr sz="1000"/>
+            <a:lvl7pPr marL="2606040" indent="0">
+              <a:buNone/>
+              <a:defRPr sz="950"/>
             </a:lvl7pPr>
-            <a:lvl8pPr marL="3200400" indent="0">
-              <a:buNone/>
-              <a:defRPr sz="1000"/>
+            <a:lvl8pPr marL="3040380" indent="0">
+              <a:buNone/>
+              <a:defRPr sz="950"/>
             </a:lvl8pPr>
-            <a:lvl9pPr marL="3657600" indent="0">
-              <a:buNone/>
-              <a:defRPr sz="1000"/>
+            <a:lvl9pPr marL="3474720" indent="0">
+              <a:buNone/>
+              <a:defRPr sz="950"/>
             </a:lvl9pPr>
           </a:lstStyle>
           <a:p>
@@ -2354,13 +2081,7 @@
       </p:sp>
       <p:sp>
         <p:nvSpPr>
-          <p:cNvPr id="5" name="Date Placeholder 4">
-            <a:extLst>
-              <a:ext uri="{FF2B5EF4-FFF2-40B4-BE49-F238E27FC236}">
-                <a16:creationId xmlns:a16="http://schemas.microsoft.com/office/drawing/2014/main" id="{FE3542D4-A5D9-0042-AFE5-BAFDD7D6EF9F}"/>
-              </a:ext>
-            </a:extLst>
-          </p:cNvPr>
+          <p:cNvPr id="5" name="Date Placeholder 4"/>
           <p:cNvSpPr>
             <a:spLocks noGrp="1"/>
           </p:cNvSpPr>
@@ -2375,7 +2096,7 @@
           <a:p>
             <a:fld id="{0F363A7F-1990-1A42-83C2-334856CEA27B}" type="datetimeFigureOut">
               <a:rPr lang="en-US" smtClean="0"/>
-              <a:t>1/13/22</a:t>
+              <a:t>2/25/22</a:t>
             </a:fld>
             <a:endParaRPr lang="en-US"/>
           </a:p>
@@ -2383,13 +2104,7 @@
       </p:sp>
       <p:sp>
         <p:nvSpPr>
-          <p:cNvPr id="6" name="Footer Placeholder 5">
-            <a:extLst>
-              <a:ext uri="{FF2B5EF4-FFF2-40B4-BE49-F238E27FC236}">
-                <a16:creationId xmlns:a16="http://schemas.microsoft.com/office/drawing/2014/main" id="{FC3431EC-8D93-C54B-90F1-0DEEC69EC349}"/>
-              </a:ext>
-            </a:extLst>
-          </p:cNvPr>
+          <p:cNvPr id="6" name="Footer Placeholder 5"/>
           <p:cNvSpPr>
             <a:spLocks noGrp="1"/>
           </p:cNvSpPr>
@@ -2408,13 +2123,7 @@
       </p:sp>
       <p:sp>
         <p:nvSpPr>
-          <p:cNvPr id="7" name="Slide Number Placeholder 6">
-            <a:extLst>
-              <a:ext uri="{FF2B5EF4-FFF2-40B4-BE49-F238E27FC236}">
-                <a16:creationId xmlns:a16="http://schemas.microsoft.com/office/drawing/2014/main" id="{AA48BBE1-C0C7-144A-A6FB-AB4B398DE6E5}"/>
-              </a:ext>
-            </a:extLst>
-          </p:cNvPr>
+          <p:cNvPr id="7" name="Slide Number Placeholder 6"/>
           <p:cNvSpPr>
             <a:spLocks noGrp="1"/>
           </p:cNvSpPr>
@@ -2438,7 +2147,7 @@
     </p:spTree>
     <p:extLst>
       <p:ext uri="{BB962C8B-B14F-4D97-AF65-F5344CB8AC3E}">
-        <p14:creationId xmlns:p14="http://schemas.microsoft.com/office/powerpoint/2010/main" val="2315434632"/>
+        <p14:creationId xmlns:p14="http://schemas.microsoft.com/office/powerpoint/2010/main" val="933242483"/>
       </p:ext>
     </p:extLst>
   </p:cSld>
@@ -2467,13 +2176,7 @@
       </p:grpSpPr>
       <p:sp>
         <p:nvSpPr>
-          <p:cNvPr id="2" name="Title 1">
-            <a:extLst>
-              <a:ext uri="{FF2B5EF4-FFF2-40B4-BE49-F238E27FC236}">
-                <a16:creationId xmlns:a16="http://schemas.microsoft.com/office/drawing/2014/main" id="{3383C5A4-30AB-B044-8C8D-5DFC9A0EA481}"/>
-              </a:ext>
-            </a:extLst>
-          </p:cNvPr>
+          <p:cNvPr id="2" name="Title 1"/>
           <p:cNvSpPr>
             <a:spLocks noGrp="1"/>
           </p:cNvSpPr>
@@ -2483,15 +2186,15 @@
         </p:nvSpPr>
         <p:spPr>
           <a:xfrm>
-            <a:off x="839788" y="457200"/>
-            <a:ext cx="3932237" cy="1600200"/>
+            <a:off x="598349" y="457200"/>
+            <a:ext cx="2801719" cy="1600200"/>
           </a:xfrm>
         </p:spPr>
         <p:txBody>
           <a:bodyPr anchor="b"/>
           <a:lstStyle>
             <a:lvl1pPr>
-              <a:defRPr sz="3200"/>
+              <a:defRPr sz="3040"/>
             </a:lvl1pPr>
           </a:lstStyle>
           <a:p>
@@ -2499,20 +2202,15 @@
               <a:rPr lang="en-US"/>
               <a:t>Click to edit Master title style</a:t>
             </a:r>
-          </a:p>
-        </p:txBody>
-      </p:sp>
-      <p:sp>
-        <p:nvSpPr>
-          <p:cNvPr id="3" name="Picture Placeholder 2">
-            <a:extLst>
-              <a:ext uri="{FF2B5EF4-FFF2-40B4-BE49-F238E27FC236}">
-                <a16:creationId xmlns:a16="http://schemas.microsoft.com/office/drawing/2014/main" id="{298903BB-56D8-8840-9E6F-0F1DA1B84E77}"/>
-              </a:ext>
-            </a:extLst>
-          </p:cNvPr>
-          <p:cNvSpPr>
-            <a:spLocks noGrp="1"/>
+            <a:endParaRPr lang="en-US" dirty="0"/>
+          </a:p>
+        </p:txBody>
+      </p:sp>
+      <p:sp>
+        <p:nvSpPr>
+          <p:cNvPr id="3" name="Picture Placeholder 2"/>
+          <p:cNvSpPr>
+            <a:spLocks noGrp="1" noChangeAspect="1"/>
           </p:cNvSpPr>
           <p:nvPr>
             <p:ph type="pic" idx="1"/>
@@ -2520,64 +2218,62 @@
         </p:nvSpPr>
         <p:spPr>
           <a:xfrm>
-            <a:off x="5183188" y="987425"/>
-            <a:ext cx="6172200" cy="4873625"/>
+            <a:off x="3693021" y="987427"/>
+            <a:ext cx="4397693" cy="4873625"/>
           </a:xfrm>
         </p:spPr>
         <p:txBody>
-          <a:bodyPr/>
+          <a:bodyPr anchor="t"/>
           <a:lstStyle>
             <a:lvl1pPr marL="0" indent="0">
               <a:buNone/>
-              <a:defRPr sz="3200"/>
+              <a:defRPr sz="3040"/>
             </a:lvl1pPr>
-            <a:lvl2pPr marL="457200" indent="0">
-              <a:buNone/>
-              <a:defRPr sz="2800"/>
+            <a:lvl2pPr marL="434340" indent="0">
+              <a:buNone/>
+              <a:defRPr sz="2660"/>
             </a:lvl2pPr>
-            <a:lvl3pPr marL="914400" indent="0">
-              <a:buNone/>
-              <a:defRPr sz="2400"/>
+            <a:lvl3pPr marL="868680" indent="0">
+              <a:buNone/>
+              <a:defRPr sz="2280"/>
             </a:lvl3pPr>
-            <a:lvl4pPr marL="1371600" indent="0">
-              <a:buNone/>
-              <a:defRPr sz="2000"/>
+            <a:lvl4pPr marL="1303020" indent="0">
+              <a:buNone/>
+              <a:defRPr sz="1900"/>
             </a:lvl4pPr>
-            <a:lvl5pPr marL="1828800" indent="0">
-              <a:buNone/>
-              <a:defRPr sz="2000"/>
+            <a:lvl5pPr marL="1737360" indent="0">
+              <a:buNone/>
+              <a:defRPr sz="1900"/>
             </a:lvl5pPr>
-            <a:lvl6pPr marL="2286000" indent="0">
-              <a:buNone/>
-              <a:defRPr sz="2000"/>
+            <a:lvl6pPr marL="2171700" indent="0">
+              <a:buNone/>
+              <a:defRPr sz="1900"/>
             </a:lvl6pPr>
-            <a:lvl7pPr marL="2743200" indent="0">
-              <a:buNone/>
-              <a:defRPr sz="2000"/>
+            <a:lvl7pPr marL="2606040" indent="0">
+              <a:buNone/>
+              <a:defRPr sz="1900"/>
             </a:lvl7pPr>
-            <a:lvl8pPr marL="3200400" indent="0">
-              <a:buNone/>
-              <a:defRPr sz="2000"/>
+            <a:lvl8pPr marL="3040380" indent="0">
+              <a:buNone/>
+              <a:defRPr sz="1900"/>
             </a:lvl8pPr>
-            <a:lvl9pPr marL="3657600" indent="0">
-              <a:buNone/>
-              <a:defRPr sz="2000"/>
+            <a:lvl9pPr marL="3474720" indent="0">
+              <a:buNone/>
+              <a:defRPr sz="1900"/>
             </a:lvl9pPr>
           </a:lstStyle>
           <a:p>
-            <a:endParaRPr lang="en-US"/>
-          </a:p>
-        </p:txBody>
-      </p:sp>
-      <p:sp>
-        <p:nvSpPr>
-          <p:cNvPr id="4" name="Text Placeholder 3">
-            <a:extLst>
-              <a:ext uri="{FF2B5EF4-FFF2-40B4-BE49-F238E27FC236}">
-                <a16:creationId xmlns:a16="http://schemas.microsoft.com/office/drawing/2014/main" id="{C7AFBB77-8317-064E-A67B-CA3005741138}"/>
-              </a:ext>
-            </a:extLst>
-          </p:cNvPr>
+            <a:r>
+              <a:rPr lang="en-US"/>
+              <a:t>Click icon to add picture</a:t>
+            </a:r>
+            <a:endParaRPr lang="en-US" dirty="0"/>
+          </a:p>
+        </p:txBody>
+      </p:sp>
+      <p:sp>
+        <p:nvSpPr>
+          <p:cNvPr id="4" name="Text Placeholder 3"/>
           <p:cNvSpPr>
             <a:spLocks noGrp="1"/>
           </p:cNvSpPr>
@@ -2587,8 +2283,8 @@
         </p:nvSpPr>
         <p:spPr>
           <a:xfrm>
-            <a:off x="839788" y="2057400"/>
-            <a:ext cx="3932237" cy="3811588"/>
+            <a:off x="598349" y="2057400"/>
+            <a:ext cx="2801719" cy="3811588"/>
           </a:xfrm>
         </p:spPr>
         <p:txBody>
@@ -2596,39 +2292,39 @@
           <a:lstStyle>
             <a:lvl1pPr marL="0" indent="0">
               <a:buNone/>
-              <a:defRPr sz="1600"/>
+              <a:defRPr sz="1520"/>
             </a:lvl1pPr>
-            <a:lvl2pPr marL="457200" indent="0">
-              <a:buNone/>
-              <a:defRPr sz="1400"/>
+            <a:lvl2pPr marL="434340" indent="0">
+              <a:buNone/>
+              <a:defRPr sz="1330"/>
             </a:lvl2pPr>
-            <a:lvl3pPr marL="914400" indent="0">
-              <a:buNone/>
-              <a:defRPr sz="1200"/>
+            <a:lvl3pPr marL="868680" indent="0">
+              <a:buNone/>
+              <a:defRPr sz="1140"/>
             </a:lvl3pPr>
-            <a:lvl4pPr marL="1371600" indent="0">
-              <a:buNone/>
-              <a:defRPr sz="1000"/>
+            <a:lvl4pPr marL="1303020" indent="0">
+              <a:buNone/>
+              <a:defRPr sz="950"/>
             </a:lvl4pPr>
-            <a:lvl5pPr marL="1828800" indent="0">
-              <a:buNone/>
-              <a:defRPr sz="1000"/>
+            <a:lvl5pPr marL="1737360" indent="0">
+              <a:buNone/>
+              <a:defRPr sz="950"/>
             </a:lvl5pPr>
-            <a:lvl6pPr marL="2286000" indent="0">
-              <a:buNone/>
-              <a:defRPr sz="1000"/>
+            <a:lvl6pPr marL="2171700" indent="0">
+              <a:buNone/>
+              <a:defRPr sz="950"/>
             </a:lvl6pPr>
-            <a:lvl7pPr marL="2743200" indent="0">
-              <a:buNone/>
-              <a:defRPr sz="1000"/>
+            <a:lvl7pPr marL="2606040" indent="0">
+              <a:buNone/>
+              <a:defRPr sz="950"/>
             </a:lvl7pPr>
-            <a:lvl8pPr marL="3200400" indent="0">
-              <a:buNone/>
-              <a:defRPr sz="1000"/>
+            <a:lvl8pPr marL="3040380" indent="0">
+              <a:buNone/>
+              <a:defRPr sz="950"/>
             </a:lvl8pPr>
-            <a:lvl9pPr marL="3657600" indent="0">
-              <a:buNone/>
-              <a:defRPr sz="1000"/>
+            <a:lvl9pPr marL="3474720" indent="0">
+              <a:buNone/>
+              <a:defRPr sz="950"/>
             </a:lvl9pPr>
           </a:lstStyle>
           <a:p>
@@ -2642,13 +2338,7 @@
       </p:sp>
       <p:sp>
         <p:nvSpPr>
-          <p:cNvPr id="5" name="Date Placeholder 4">
-            <a:extLst>
-              <a:ext uri="{FF2B5EF4-FFF2-40B4-BE49-F238E27FC236}">
-                <a16:creationId xmlns:a16="http://schemas.microsoft.com/office/drawing/2014/main" id="{4D9AE882-6920-7E4E-A6B1-2893FDBD685C}"/>
-              </a:ext>
-            </a:extLst>
-          </p:cNvPr>
+          <p:cNvPr id="5" name="Date Placeholder 4"/>
           <p:cNvSpPr>
             <a:spLocks noGrp="1"/>
           </p:cNvSpPr>
@@ -2663,7 +2353,7 @@
           <a:p>
             <a:fld id="{0F363A7F-1990-1A42-83C2-334856CEA27B}" type="datetimeFigureOut">
               <a:rPr lang="en-US" smtClean="0"/>
-              <a:t>1/13/22</a:t>
+              <a:t>2/25/22</a:t>
             </a:fld>
             <a:endParaRPr lang="en-US"/>
           </a:p>
@@ -2671,13 +2361,7 @@
       </p:sp>
       <p:sp>
         <p:nvSpPr>
-          <p:cNvPr id="6" name="Footer Placeholder 5">
-            <a:extLst>
-              <a:ext uri="{FF2B5EF4-FFF2-40B4-BE49-F238E27FC236}">
-                <a16:creationId xmlns:a16="http://schemas.microsoft.com/office/drawing/2014/main" id="{A67DBC9D-7FDE-334C-A199-67AC9FEC7903}"/>
-              </a:ext>
-            </a:extLst>
-          </p:cNvPr>
+          <p:cNvPr id="6" name="Footer Placeholder 5"/>
           <p:cNvSpPr>
             <a:spLocks noGrp="1"/>
           </p:cNvSpPr>
@@ -2696,13 +2380,7 @@
       </p:sp>
       <p:sp>
         <p:nvSpPr>
-          <p:cNvPr id="7" name="Slide Number Placeholder 6">
-            <a:extLst>
-              <a:ext uri="{FF2B5EF4-FFF2-40B4-BE49-F238E27FC236}">
-                <a16:creationId xmlns:a16="http://schemas.microsoft.com/office/drawing/2014/main" id="{827F3BA8-0F47-ED48-B0DE-F74F14C017BA}"/>
-              </a:ext>
-            </a:extLst>
-          </p:cNvPr>
+          <p:cNvPr id="7" name="Slide Number Placeholder 6"/>
           <p:cNvSpPr>
             <a:spLocks noGrp="1"/>
           </p:cNvSpPr>
@@ -2726,7 +2404,7 @@
     </p:spTree>
     <p:extLst>
       <p:ext uri="{BB962C8B-B14F-4D97-AF65-F5344CB8AC3E}">
-        <p14:creationId xmlns:p14="http://schemas.microsoft.com/office/powerpoint/2010/main" val="1060850350"/>
+        <p14:creationId xmlns:p14="http://schemas.microsoft.com/office/powerpoint/2010/main" val="33161061"/>
       </p:ext>
     </p:extLst>
   </p:cSld>
@@ -2760,13 +2438,7 @@
       </p:grpSpPr>
       <p:sp>
         <p:nvSpPr>
-          <p:cNvPr id="2" name="Title Placeholder 1">
-            <a:extLst>
-              <a:ext uri="{FF2B5EF4-FFF2-40B4-BE49-F238E27FC236}">
-                <a16:creationId xmlns:a16="http://schemas.microsoft.com/office/drawing/2014/main" id="{67165DB2-CEAF-AA42-BD82-1E0136E72398}"/>
-              </a:ext>
-            </a:extLst>
-          </p:cNvPr>
+          <p:cNvPr id="2" name="Title Placeholder 1"/>
           <p:cNvSpPr>
             <a:spLocks noGrp="1"/>
           </p:cNvSpPr>
@@ -2776,8 +2448,8 @@
         </p:nvSpPr>
         <p:spPr>
           <a:xfrm>
-            <a:off x="838200" y="365125"/>
-            <a:ext cx="10515600" cy="1325563"/>
+            <a:off x="597218" y="365127"/>
+            <a:ext cx="7492365" cy="1325563"/>
           </a:xfrm>
           <a:prstGeom prst="rect">
             <a:avLst/>
@@ -2793,18 +2465,13 @@
               <a:rPr lang="en-US"/>
               <a:t>Click to edit Master title style</a:t>
             </a:r>
-          </a:p>
-        </p:txBody>
-      </p:sp>
-      <p:sp>
-        <p:nvSpPr>
-          <p:cNvPr id="3" name="Text Placeholder 2">
-            <a:extLst>
-              <a:ext uri="{FF2B5EF4-FFF2-40B4-BE49-F238E27FC236}">
-                <a16:creationId xmlns:a16="http://schemas.microsoft.com/office/drawing/2014/main" id="{2DFE6B9D-4BDF-624A-B900-FF72FC97B674}"/>
-              </a:ext>
-            </a:extLst>
-          </p:cNvPr>
+            <a:endParaRPr lang="en-US" dirty="0"/>
+          </a:p>
+        </p:txBody>
+      </p:sp>
+      <p:sp>
+        <p:nvSpPr>
+          <p:cNvPr id="3" name="Text Placeholder 2"/>
           <p:cNvSpPr>
             <a:spLocks noGrp="1"/>
           </p:cNvSpPr>
@@ -2814,8 +2481,8 @@
         </p:nvSpPr>
         <p:spPr>
           <a:xfrm>
-            <a:off x="838200" y="1825625"/>
-            <a:ext cx="10515600" cy="4351338"/>
+            <a:off x="597218" y="1825625"/>
+            <a:ext cx="7492365" cy="4351338"/>
           </a:xfrm>
           <a:prstGeom prst="rect">
             <a:avLst/>
@@ -2860,18 +2527,13 @@
               <a:rPr lang="en-US"/>
               <a:t>Fifth level</a:t>
             </a:r>
-          </a:p>
-        </p:txBody>
-      </p:sp>
-      <p:sp>
-        <p:nvSpPr>
-          <p:cNvPr id="4" name="Date Placeholder 3">
-            <a:extLst>
-              <a:ext uri="{FF2B5EF4-FFF2-40B4-BE49-F238E27FC236}">
-                <a16:creationId xmlns:a16="http://schemas.microsoft.com/office/drawing/2014/main" id="{BBD8B24E-7358-C649-BBFD-12EDEAC7DDF7}"/>
-              </a:ext>
-            </a:extLst>
-          </p:cNvPr>
+            <a:endParaRPr lang="en-US" dirty="0"/>
+          </a:p>
+        </p:txBody>
+      </p:sp>
+      <p:sp>
+        <p:nvSpPr>
+          <p:cNvPr id="4" name="Date Placeholder 3"/>
           <p:cNvSpPr>
             <a:spLocks noGrp="1"/>
           </p:cNvSpPr>
@@ -2881,8 +2543,8 @@
         </p:nvSpPr>
         <p:spPr>
           <a:xfrm>
-            <a:off x="838200" y="6356350"/>
-            <a:ext cx="2743200" cy="365125"/>
+            <a:off x="597218" y="6356352"/>
+            <a:ext cx="1954530" cy="365125"/>
           </a:xfrm>
           <a:prstGeom prst="rect">
             <a:avLst/>
@@ -2892,7 +2554,7 @@
           <a:bodyPr vert="horz" lIns="91440" tIns="45720" rIns="91440" bIns="45720" rtlCol="0" anchor="ctr"/>
           <a:lstStyle>
             <a:lvl1pPr algn="l">
-              <a:defRPr sz="1200">
+              <a:defRPr sz="1140">
                 <a:solidFill>
                   <a:schemeClr val="tx1">
                     <a:tint val="75000"/>
@@ -2904,7 +2566,7 @@
           <a:p>
             <a:fld id="{0F363A7F-1990-1A42-83C2-334856CEA27B}" type="datetimeFigureOut">
               <a:rPr lang="en-US" smtClean="0"/>
-              <a:t>1/13/22</a:t>
+              <a:t>2/25/22</a:t>
             </a:fld>
             <a:endParaRPr lang="en-US"/>
           </a:p>
@@ -2912,13 +2574,7 @@
       </p:sp>
       <p:sp>
         <p:nvSpPr>
-          <p:cNvPr id="5" name="Footer Placeholder 4">
-            <a:extLst>
-              <a:ext uri="{FF2B5EF4-FFF2-40B4-BE49-F238E27FC236}">
-                <a16:creationId xmlns:a16="http://schemas.microsoft.com/office/drawing/2014/main" id="{5B173FA9-43F7-C04E-8C91-07AB33170E4E}"/>
-              </a:ext>
-            </a:extLst>
-          </p:cNvPr>
+          <p:cNvPr id="5" name="Footer Placeholder 4"/>
           <p:cNvSpPr>
             <a:spLocks noGrp="1"/>
           </p:cNvSpPr>
@@ -2928,8 +2584,8 @@
         </p:nvSpPr>
         <p:spPr>
           <a:xfrm>
-            <a:off x="4038600" y="6356350"/>
-            <a:ext cx="4114800" cy="365125"/>
+            <a:off x="2877503" y="6356352"/>
+            <a:ext cx="2931795" cy="365125"/>
           </a:xfrm>
           <a:prstGeom prst="rect">
             <a:avLst/>
@@ -2939,7 +2595,7 @@
           <a:bodyPr vert="horz" lIns="91440" tIns="45720" rIns="91440" bIns="45720" rtlCol="0" anchor="ctr"/>
           <a:lstStyle>
             <a:lvl1pPr algn="ctr">
-              <a:defRPr sz="1200">
+              <a:defRPr sz="1140">
                 <a:solidFill>
                   <a:schemeClr val="tx1">
                     <a:tint val="75000"/>
@@ -2955,13 +2611,7 @@
       </p:sp>
       <p:sp>
         <p:nvSpPr>
-          <p:cNvPr id="6" name="Slide Number Placeholder 5">
-            <a:extLst>
-              <a:ext uri="{FF2B5EF4-FFF2-40B4-BE49-F238E27FC236}">
-                <a16:creationId xmlns:a16="http://schemas.microsoft.com/office/drawing/2014/main" id="{8F3A87CA-C109-D348-8E68-F3EF75B8981F}"/>
-              </a:ext>
-            </a:extLst>
-          </p:cNvPr>
+          <p:cNvPr id="6" name="Slide Number Placeholder 5"/>
           <p:cNvSpPr>
             <a:spLocks noGrp="1"/>
           </p:cNvSpPr>
@@ -2971,8 +2621,8 @@
         </p:nvSpPr>
         <p:spPr>
           <a:xfrm>
-            <a:off x="8610600" y="6356350"/>
-            <a:ext cx="2743200" cy="365125"/>
+            <a:off x="6135053" y="6356352"/>
+            <a:ext cx="1954530" cy="365125"/>
           </a:xfrm>
           <a:prstGeom prst="rect">
             <a:avLst/>
@@ -2982,7 +2632,7 @@
           <a:bodyPr vert="horz" lIns="91440" tIns="45720" rIns="91440" bIns="45720" rtlCol="0" anchor="ctr"/>
           <a:lstStyle>
             <a:lvl1pPr algn="r">
-              <a:defRPr sz="1200">
+              <a:defRPr sz="1140">
                 <a:solidFill>
                   <a:schemeClr val="tx1">
                     <a:tint val="75000"/>
@@ -3003,27 +2653,27 @@
     </p:spTree>
     <p:extLst>
       <p:ext uri="{BB962C8B-B14F-4D97-AF65-F5344CB8AC3E}">
-        <p14:creationId xmlns:p14="http://schemas.microsoft.com/office/powerpoint/2010/main" val="3668398016"/>
+        <p14:creationId xmlns:p14="http://schemas.microsoft.com/office/powerpoint/2010/main" val="4233414449"/>
       </p:ext>
     </p:extLst>
   </p:cSld>
   <p:clrMap bg1="lt1" tx1="dk1" bg2="lt2" tx2="dk2" accent1="accent1" accent2="accent2" accent3="accent3" accent4="accent4" accent5="accent5" accent6="accent6" hlink="hlink" folHlink="folHlink"/>
   <p:sldLayoutIdLst>
-    <p:sldLayoutId id="2147483649" r:id="rId1"/>
-    <p:sldLayoutId id="2147483650" r:id="rId2"/>
-    <p:sldLayoutId id="2147483651" r:id="rId3"/>
-    <p:sldLayoutId id="2147483652" r:id="rId4"/>
-    <p:sldLayoutId id="2147483653" r:id="rId5"/>
-    <p:sldLayoutId id="2147483654" r:id="rId6"/>
-    <p:sldLayoutId id="2147483655" r:id="rId7"/>
-    <p:sldLayoutId id="2147483656" r:id="rId8"/>
-    <p:sldLayoutId id="2147483657" r:id="rId9"/>
-    <p:sldLayoutId id="2147483658" r:id="rId10"/>
-    <p:sldLayoutId id="2147483659" r:id="rId11"/>
+    <p:sldLayoutId id="2147483673" r:id="rId1"/>
+    <p:sldLayoutId id="2147483674" r:id="rId2"/>
+    <p:sldLayoutId id="2147483675" r:id="rId3"/>
+    <p:sldLayoutId id="2147483676" r:id="rId4"/>
+    <p:sldLayoutId id="2147483677" r:id="rId5"/>
+    <p:sldLayoutId id="2147483678" r:id="rId6"/>
+    <p:sldLayoutId id="2147483679" r:id="rId7"/>
+    <p:sldLayoutId id="2147483680" r:id="rId8"/>
+    <p:sldLayoutId id="2147483681" r:id="rId9"/>
+    <p:sldLayoutId id="2147483682" r:id="rId10"/>
+    <p:sldLayoutId id="2147483683" r:id="rId11"/>
   </p:sldLayoutIdLst>
   <p:txStyles>
     <p:titleStyle>
-      <a:lvl1pPr algn="l" defTabSz="914400" rtl="0" eaLnBrk="1" latinLnBrk="0" hangingPunct="1">
+      <a:lvl1pPr algn="l" defTabSz="868680" rtl="0" eaLnBrk="1" latinLnBrk="0" hangingPunct="1">
         <a:lnSpc>
           <a:spcPct val="90000"/>
         </a:lnSpc>
@@ -3031,7 +2681,7 @@
           <a:spcPct val="0"/>
         </a:spcBef>
         <a:buNone/>
-        <a:defRPr sz="4400" kern="1200">
+        <a:defRPr sz="4180" kern="1200">
           <a:solidFill>
             <a:schemeClr val="tx1"/>
           </a:solidFill>
@@ -3042,16 +2692,16 @@
       </a:lvl1pPr>
     </p:titleStyle>
     <p:bodyStyle>
-      <a:lvl1pPr marL="228600" indent="-228600" algn="l" defTabSz="914400" rtl="0" eaLnBrk="1" latinLnBrk="0" hangingPunct="1">
+      <a:lvl1pPr marL="217170" indent="-217170" algn="l" defTabSz="868680" rtl="0" eaLnBrk="1" latinLnBrk="0" hangingPunct="1">
         <a:lnSpc>
           <a:spcPct val="90000"/>
         </a:lnSpc>
         <a:spcBef>
-          <a:spcPts val="1000"/>
+          <a:spcPts val="950"/>
         </a:spcBef>
         <a:buFont typeface="Arial" panose="020B0604020202020204" pitchFamily="34" charset="0"/>
         <a:buChar char="•"/>
-        <a:defRPr sz="2800" kern="1200">
+        <a:defRPr sz="2660" kern="1200">
           <a:solidFill>
             <a:schemeClr val="tx1"/>
           </a:solidFill>
@@ -3060,16 +2710,16 @@
           <a:cs typeface="+mn-cs"/>
         </a:defRPr>
       </a:lvl1pPr>
-      <a:lvl2pPr marL="685800" indent="-228600" algn="l" defTabSz="914400" rtl="0" eaLnBrk="1" latinLnBrk="0" hangingPunct="1">
+      <a:lvl2pPr marL="651510" indent="-217170" algn="l" defTabSz="868680" rtl="0" eaLnBrk="1" latinLnBrk="0" hangingPunct="1">
         <a:lnSpc>
           <a:spcPct val="90000"/>
         </a:lnSpc>
         <a:spcBef>
-          <a:spcPts val="500"/>
+          <a:spcPts val="475"/>
         </a:spcBef>
         <a:buFont typeface="Arial" panose="020B0604020202020204" pitchFamily="34" charset="0"/>
         <a:buChar char="•"/>
-        <a:defRPr sz="2400" kern="1200">
+        <a:defRPr sz="2280" kern="1200">
           <a:solidFill>
             <a:schemeClr val="tx1"/>
           </a:solidFill>
@@ -3078,16 +2728,16 @@
           <a:cs typeface="+mn-cs"/>
         </a:defRPr>
       </a:lvl2pPr>
-      <a:lvl3pPr marL="1143000" indent="-228600" algn="l" defTabSz="914400" rtl="0" eaLnBrk="1" latinLnBrk="0" hangingPunct="1">
+      <a:lvl3pPr marL="1085850" indent="-217170" algn="l" defTabSz="868680" rtl="0" eaLnBrk="1" latinLnBrk="0" hangingPunct="1">
         <a:lnSpc>
           <a:spcPct val="90000"/>
         </a:lnSpc>
         <a:spcBef>
-          <a:spcPts val="500"/>
+          <a:spcPts val="475"/>
         </a:spcBef>
         <a:buFont typeface="Arial" panose="020B0604020202020204" pitchFamily="34" charset="0"/>
         <a:buChar char="•"/>
-        <a:defRPr sz="2000" kern="1200">
+        <a:defRPr sz="1900" kern="1200">
           <a:solidFill>
             <a:schemeClr val="tx1"/>
           </a:solidFill>
@@ -3096,16 +2746,16 @@
           <a:cs typeface="+mn-cs"/>
         </a:defRPr>
       </a:lvl3pPr>
-      <a:lvl4pPr marL="1600200" indent="-228600" algn="l" defTabSz="914400" rtl="0" eaLnBrk="1" latinLnBrk="0" hangingPunct="1">
+      <a:lvl4pPr marL="1520190" indent="-217170" algn="l" defTabSz="868680" rtl="0" eaLnBrk="1" latinLnBrk="0" hangingPunct="1">
         <a:lnSpc>
           <a:spcPct val="90000"/>
         </a:lnSpc>
         <a:spcBef>
-          <a:spcPts val="500"/>
+          <a:spcPts val="475"/>
         </a:spcBef>
         <a:buFont typeface="Arial" panose="020B0604020202020204" pitchFamily="34" charset="0"/>
         <a:buChar char="•"/>
-        <a:defRPr sz="1800" kern="1200">
+        <a:defRPr sz="1710" kern="1200">
           <a:solidFill>
             <a:schemeClr val="tx1"/>
           </a:solidFill>
@@ -3114,16 +2764,16 @@
           <a:cs typeface="+mn-cs"/>
         </a:defRPr>
       </a:lvl4pPr>
-      <a:lvl5pPr marL="2057400" indent="-228600" algn="l" defTabSz="914400" rtl="0" eaLnBrk="1" latinLnBrk="0" hangingPunct="1">
+      <a:lvl5pPr marL="1954530" indent="-217170" algn="l" defTabSz="868680" rtl="0" eaLnBrk="1" latinLnBrk="0" hangingPunct="1">
         <a:lnSpc>
           <a:spcPct val="90000"/>
         </a:lnSpc>
         <a:spcBef>
-          <a:spcPts val="500"/>
+          <a:spcPts val="475"/>
         </a:spcBef>
         <a:buFont typeface="Arial" panose="020B0604020202020204" pitchFamily="34" charset="0"/>
         <a:buChar char="•"/>
-        <a:defRPr sz="1800" kern="1200">
+        <a:defRPr sz="1710" kern="1200">
           <a:solidFill>
             <a:schemeClr val="tx1"/>
           </a:solidFill>
@@ -3132,16 +2782,16 @@
           <a:cs typeface="+mn-cs"/>
         </a:defRPr>
       </a:lvl5pPr>
-      <a:lvl6pPr marL="2514600" indent="-228600" algn="l" defTabSz="914400" rtl="0" eaLnBrk="1" latinLnBrk="0" hangingPunct="1">
+      <a:lvl6pPr marL="2388870" indent="-217170" algn="l" defTabSz="868680" rtl="0" eaLnBrk="1" latinLnBrk="0" hangingPunct="1">
         <a:lnSpc>
           <a:spcPct val="90000"/>
         </a:lnSpc>
         <a:spcBef>
-          <a:spcPts val="500"/>
+          <a:spcPts val="475"/>
         </a:spcBef>
         <a:buFont typeface="Arial" panose="020B0604020202020204" pitchFamily="34" charset="0"/>
         <a:buChar char="•"/>
-        <a:defRPr sz="1800" kern="1200">
+        <a:defRPr sz="1710" kern="1200">
           <a:solidFill>
             <a:schemeClr val="tx1"/>
           </a:solidFill>
@@ -3150,16 +2800,16 @@
           <a:cs typeface="+mn-cs"/>
         </a:defRPr>
       </a:lvl6pPr>
-      <a:lvl7pPr marL="2971800" indent="-228600" algn="l" defTabSz="914400" rtl="0" eaLnBrk="1" latinLnBrk="0" hangingPunct="1">
+      <a:lvl7pPr marL="2823210" indent="-217170" algn="l" defTabSz="868680" rtl="0" eaLnBrk="1" latinLnBrk="0" hangingPunct="1">
         <a:lnSpc>
           <a:spcPct val="90000"/>
         </a:lnSpc>
         <a:spcBef>
-          <a:spcPts val="500"/>
+          <a:spcPts val="475"/>
         </a:spcBef>
         <a:buFont typeface="Arial" panose="020B0604020202020204" pitchFamily="34" charset="0"/>
         <a:buChar char="•"/>
-        <a:defRPr sz="1800" kern="1200">
+        <a:defRPr sz="1710" kern="1200">
           <a:solidFill>
             <a:schemeClr val="tx1"/>
           </a:solidFill>
@@ -3168,16 +2818,16 @@
           <a:cs typeface="+mn-cs"/>
         </a:defRPr>
       </a:lvl7pPr>
-      <a:lvl8pPr marL="3429000" indent="-228600" algn="l" defTabSz="914400" rtl="0" eaLnBrk="1" latinLnBrk="0" hangingPunct="1">
+      <a:lvl8pPr marL="3257550" indent="-217170" algn="l" defTabSz="868680" rtl="0" eaLnBrk="1" latinLnBrk="0" hangingPunct="1">
         <a:lnSpc>
           <a:spcPct val="90000"/>
         </a:lnSpc>
         <a:spcBef>
-          <a:spcPts val="500"/>
+          <a:spcPts val="475"/>
         </a:spcBef>
         <a:buFont typeface="Arial" panose="020B0604020202020204" pitchFamily="34" charset="0"/>
         <a:buChar char="•"/>
-        <a:defRPr sz="1800" kern="1200">
+        <a:defRPr sz="1710" kern="1200">
           <a:solidFill>
             <a:schemeClr val="tx1"/>
           </a:solidFill>
@@ -3186,16 +2836,16 @@
           <a:cs typeface="+mn-cs"/>
         </a:defRPr>
       </a:lvl8pPr>
-      <a:lvl9pPr marL="3886200" indent="-228600" algn="l" defTabSz="914400" rtl="0" eaLnBrk="1" latinLnBrk="0" hangingPunct="1">
+      <a:lvl9pPr marL="3691890" indent="-217170" algn="l" defTabSz="868680" rtl="0" eaLnBrk="1" latinLnBrk="0" hangingPunct="1">
         <a:lnSpc>
           <a:spcPct val="90000"/>
         </a:lnSpc>
         <a:spcBef>
-          <a:spcPts val="500"/>
+          <a:spcPts val="475"/>
         </a:spcBef>
         <a:buFont typeface="Arial" panose="020B0604020202020204" pitchFamily="34" charset="0"/>
         <a:buChar char="•"/>
-        <a:defRPr sz="1800" kern="1200">
+        <a:defRPr sz="1710" kern="1200">
           <a:solidFill>
             <a:schemeClr val="tx1"/>
           </a:solidFill>
@@ -3209,8 +2859,8 @@
       <a:defPPr>
         <a:defRPr lang="en-US"/>
       </a:defPPr>
-      <a:lvl1pPr marL="0" algn="l" defTabSz="914400" rtl="0" eaLnBrk="1" latinLnBrk="0" hangingPunct="1">
-        <a:defRPr sz="1800" kern="1200">
+      <a:lvl1pPr marL="0" algn="l" defTabSz="868680" rtl="0" eaLnBrk="1" latinLnBrk="0" hangingPunct="1">
+        <a:defRPr sz="1710" kern="1200">
           <a:solidFill>
             <a:schemeClr val="tx1"/>
           </a:solidFill>
@@ -3219,8 +2869,8 @@
           <a:cs typeface="+mn-cs"/>
         </a:defRPr>
       </a:lvl1pPr>
-      <a:lvl2pPr marL="457200" algn="l" defTabSz="914400" rtl="0" eaLnBrk="1" latinLnBrk="0" hangingPunct="1">
-        <a:defRPr sz="1800" kern="1200">
+      <a:lvl2pPr marL="434340" algn="l" defTabSz="868680" rtl="0" eaLnBrk="1" latinLnBrk="0" hangingPunct="1">
+        <a:defRPr sz="1710" kern="1200">
           <a:solidFill>
             <a:schemeClr val="tx1"/>
           </a:solidFill>
@@ -3229,8 +2879,8 @@
           <a:cs typeface="+mn-cs"/>
         </a:defRPr>
       </a:lvl2pPr>
-      <a:lvl3pPr marL="914400" algn="l" defTabSz="914400" rtl="0" eaLnBrk="1" latinLnBrk="0" hangingPunct="1">
-        <a:defRPr sz="1800" kern="1200">
+      <a:lvl3pPr marL="868680" algn="l" defTabSz="868680" rtl="0" eaLnBrk="1" latinLnBrk="0" hangingPunct="1">
+        <a:defRPr sz="1710" kern="1200">
           <a:solidFill>
             <a:schemeClr val="tx1"/>
           </a:solidFill>
@@ -3239,8 +2889,8 @@
           <a:cs typeface="+mn-cs"/>
         </a:defRPr>
       </a:lvl3pPr>
-      <a:lvl4pPr marL="1371600" algn="l" defTabSz="914400" rtl="0" eaLnBrk="1" latinLnBrk="0" hangingPunct="1">
-        <a:defRPr sz="1800" kern="1200">
+      <a:lvl4pPr marL="1303020" algn="l" defTabSz="868680" rtl="0" eaLnBrk="1" latinLnBrk="0" hangingPunct="1">
+        <a:defRPr sz="1710" kern="1200">
           <a:solidFill>
             <a:schemeClr val="tx1"/>
           </a:solidFill>
@@ -3249,8 +2899,8 @@
           <a:cs typeface="+mn-cs"/>
         </a:defRPr>
       </a:lvl4pPr>
-      <a:lvl5pPr marL="1828800" algn="l" defTabSz="914400" rtl="0" eaLnBrk="1" latinLnBrk="0" hangingPunct="1">
-        <a:defRPr sz="1800" kern="1200">
+      <a:lvl5pPr marL="1737360" algn="l" defTabSz="868680" rtl="0" eaLnBrk="1" latinLnBrk="0" hangingPunct="1">
+        <a:defRPr sz="1710" kern="1200">
           <a:solidFill>
             <a:schemeClr val="tx1"/>
           </a:solidFill>
@@ -3259,8 +2909,8 @@
           <a:cs typeface="+mn-cs"/>
         </a:defRPr>
       </a:lvl5pPr>
-      <a:lvl6pPr marL="2286000" algn="l" defTabSz="914400" rtl="0" eaLnBrk="1" latinLnBrk="0" hangingPunct="1">
-        <a:defRPr sz="1800" kern="1200">
+      <a:lvl6pPr marL="2171700" algn="l" defTabSz="868680" rtl="0" eaLnBrk="1" latinLnBrk="0" hangingPunct="1">
+        <a:defRPr sz="1710" kern="1200">
           <a:solidFill>
             <a:schemeClr val="tx1"/>
           </a:solidFill>
@@ -3269,8 +2919,8 @@
           <a:cs typeface="+mn-cs"/>
         </a:defRPr>
       </a:lvl6pPr>
-      <a:lvl7pPr marL="2743200" algn="l" defTabSz="914400" rtl="0" eaLnBrk="1" latinLnBrk="0" hangingPunct="1">
-        <a:defRPr sz="1800" kern="1200">
+      <a:lvl7pPr marL="2606040" algn="l" defTabSz="868680" rtl="0" eaLnBrk="1" latinLnBrk="0" hangingPunct="1">
+        <a:defRPr sz="1710" kern="1200">
           <a:solidFill>
             <a:schemeClr val="tx1"/>
           </a:solidFill>
@@ -3279,8 +2929,8 @@
           <a:cs typeface="+mn-cs"/>
         </a:defRPr>
       </a:lvl7pPr>
-      <a:lvl8pPr marL="3200400" algn="l" defTabSz="914400" rtl="0" eaLnBrk="1" latinLnBrk="0" hangingPunct="1">
-        <a:defRPr sz="1800" kern="1200">
+      <a:lvl8pPr marL="3040380" algn="l" defTabSz="868680" rtl="0" eaLnBrk="1" latinLnBrk="0" hangingPunct="1">
+        <a:defRPr sz="1710" kern="1200">
           <a:solidFill>
             <a:schemeClr val="tx1"/>
           </a:solidFill>
@@ -3289,8 +2939,8 @@
           <a:cs typeface="+mn-cs"/>
         </a:defRPr>
       </a:lvl8pPr>
-      <a:lvl9pPr marL="3657600" algn="l" defTabSz="914400" rtl="0" eaLnBrk="1" latinLnBrk="0" hangingPunct="1">
-        <a:defRPr sz="1800" kern="1200">
+      <a:lvl9pPr marL="3474720" algn="l" defTabSz="868680" rtl="0" eaLnBrk="1" latinLnBrk="0" hangingPunct="1">
+        <a:defRPr sz="1710" kern="1200">
           <a:solidFill>
             <a:schemeClr val="tx1"/>
           </a:solidFill>
@@ -3321,12 +2971,152 @@
           <a:chExt cx="0" cy="0"/>
         </a:xfrm>
       </p:grpSpPr>
+      <p:grpSp>
+        <p:nvGrpSpPr>
+          <p:cNvPr id="7" name="Group 6">
+            <a:extLst>
+              <a:ext uri="{FF2B5EF4-FFF2-40B4-BE49-F238E27FC236}">
+                <a16:creationId xmlns:a16="http://schemas.microsoft.com/office/drawing/2014/main" id="{8310E39E-5005-4C49-9941-AAECD1C0C9F9}"/>
+              </a:ext>
+            </a:extLst>
+          </p:cNvPr>
+          <p:cNvGrpSpPr/>
+          <p:nvPr/>
+        </p:nvGrpSpPr>
+        <p:grpSpPr>
+          <a:xfrm>
+            <a:off x="80290" y="-400302"/>
+            <a:ext cx="7426593" cy="7198223"/>
+            <a:chOff x="242520" y="-400302"/>
+            <a:chExt cx="7426593" cy="7198223"/>
+          </a:xfrm>
+        </p:grpSpPr>
+        <p:pic>
+          <p:nvPicPr>
+            <p:cNvPr id="6" name="Picture 5">
+              <a:extLst>
+                <a:ext uri="{FF2B5EF4-FFF2-40B4-BE49-F238E27FC236}">
+                  <a16:creationId xmlns:a16="http://schemas.microsoft.com/office/drawing/2014/main" id="{4CB9BD80-C8E3-4A47-B3D9-70F0C6586E5C}"/>
+                </a:ext>
+              </a:extLst>
+            </p:cNvPr>
+            <p:cNvPicPr>
+              <a:picLocks noChangeAspect="1"/>
+            </p:cNvPicPr>
+            <p:nvPr/>
+          </p:nvPicPr>
+          <p:blipFill>
+            <a:blip r:embed="rId2"/>
+            <a:srcRect/>
+            <a:stretch/>
+          </p:blipFill>
+          <p:spPr>
+            <a:xfrm>
+              <a:off x="436136" y="-400302"/>
+              <a:ext cx="6928770" cy="7198223"/>
+            </a:xfrm>
+            <a:prstGeom prst="rect">
+              <a:avLst/>
+            </a:prstGeom>
+          </p:spPr>
+        </p:pic>
+        <p:pic>
+          <p:nvPicPr>
+            <p:cNvPr id="11" name="Picture 10">
+              <a:extLst>
+                <a:ext uri="{FF2B5EF4-FFF2-40B4-BE49-F238E27FC236}">
+                  <a16:creationId xmlns:a16="http://schemas.microsoft.com/office/drawing/2014/main" id="{4F54FA1A-A546-4B44-9FA5-C730DB93F1CE}"/>
+                </a:ext>
+              </a:extLst>
+            </p:cNvPr>
+            <p:cNvPicPr>
+              <a:picLocks noChangeAspect="1"/>
+            </p:cNvPicPr>
+            <p:nvPr/>
+          </p:nvPicPr>
+          <p:blipFill>
+            <a:blip r:embed="rId3"/>
+            <a:stretch>
+              <a:fillRect/>
+            </a:stretch>
+          </p:blipFill>
+          <p:spPr>
+            <a:xfrm rot="16532666">
+              <a:off x="6598596" y="2214801"/>
+              <a:ext cx="1698473" cy="442561"/>
+            </a:xfrm>
+            <a:prstGeom prst="rect">
+              <a:avLst/>
+            </a:prstGeom>
+          </p:spPr>
+        </p:pic>
+        <p:pic>
+          <p:nvPicPr>
+            <p:cNvPr id="13" name="Picture 12">
+              <a:extLst>
+                <a:ext uri="{FF2B5EF4-FFF2-40B4-BE49-F238E27FC236}">
+                  <a16:creationId xmlns:a16="http://schemas.microsoft.com/office/drawing/2014/main" id="{F91BD985-6E63-194A-9EFD-4BC5747F4993}"/>
+                </a:ext>
+              </a:extLst>
+            </p:cNvPr>
+            <p:cNvPicPr>
+              <a:picLocks noChangeAspect="1"/>
+            </p:cNvPicPr>
+            <p:nvPr/>
+          </p:nvPicPr>
+          <p:blipFill>
+            <a:blip r:embed="rId4"/>
+            <a:stretch>
+              <a:fillRect/>
+            </a:stretch>
+          </p:blipFill>
+          <p:spPr>
+            <a:xfrm rot="2645702">
+              <a:off x="242520" y="5506057"/>
+              <a:ext cx="1305236" cy="468871"/>
+            </a:xfrm>
+            <a:prstGeom prst="rect">
+              <a:avLst/>
+            </a:prstGeom>
+          </p:spPr>
+        </p:pic>
+        <p:pic>
+          <p:nvPicPr>
+            <p:cNvPr id="15" name="Picture 14">
+              <a:extLst>
+                <a:ext uri="{FF2B5EF4-FFF2-40B4-BE49-F238E27FC236}">
+                  <a16:creationId xmlns:a16="http://schemas.microsoft.com/office/drawing/2014/main" id="{85FE687D-EE7D-EA44-8193-70F1F9EE4A55}"/>
+                </a:ext>
+              </a:extLst>
+            </p:cNvPr>
+            <p:cNvPicPr>
+              <a:picLocks noChangeAspect="1"/>
+            </p:cNvPicPr>
+            <p:nvPr/>
+          </p:nvPicPr>
+          <p:blipFill>
+            <a:blip r:embed="rId5"/>
+            <a:stretch>
+              <a:fillRect/>
+            </a:stretch>
+          </p:blipFill>
+          <p:spPr>
+            <a:xfrm rot="19368376">
+              <a:off x="4806944" y="5551143"/>
+              <a:ext cx="2129559" cy="618723"/>
+            </a:xfrm>
+            <a:prstGeom prst="rect">
+              <a:avLst/>
+            </a:prstGeom>
+          </p:spPr>
+        </p:pic>
+      </p:grpSp>
       <p:pic>
         <p:nvPicPr>
           <p:cNvPr id="5" name="Picture 4">
             <a:extLst>
               <a:ext uri="{FF2B5EF4-FFF2-40B4-BE49-F238E27FC236}">
-                <a16:creationId xmlns:a16="http://schemas.microsoft.com/office/drawing/2014/main" id="{0DB766CF-768F-B842-AC96-503626C9531A}"/>
+                <a16:creationId xmlns:a16="http://schemas.microsoft.com/office/drawing/2014/main" id="{0A91A027-AA41-6941-9A0C-68686A909061}"/>
               </a:ext>
             </a:extLst>
           </p:cNvPr>
@@ -3335,106 +3125,15 @@
           </p:cNvPicPr>
           <p:nvPr/>
         </p:nvPicPr>
-        <p:blipFill>
-          <a:blip r:embed="rId2"/>
-          <a:stretch>
-            <a:fillRect/>
-          </a:stretch>
+        <p:blipFill rotWithShape="1">
+          <a:blip r:embed="rId6"/>
+          <a:srcRect l="85255" b="14050"/>
+          <a:stretch/>
         </p:blipFill>
         <p:spPr>
           <a:xfrm>
-            <a:off x="1429556" y="-376945"/>
-            <a:ext cx="6321380" cy="6567211"/>
-          </a:xfrm>
-          <a:prstGeom prst="rect">
-            <a:avLst/>
-          </a:prstGeom>
-        </p:spPr>
-      </p:pic>
-      <p:pic>
-        <p:nvPicPr>
-          <p:cNvPr id="11" name="Picture 10">
-            <a:extLst>
-              <a:ext uri="{FF2B5EF4-FFF2-40B4-BE49-F238E27FC236}">
-                <a16:creationId xmlns:a16="http://schemas.microsoft.com/office/drawing/2014/main" id="{4F54FA1A-A546-4B44-9FA5-C730DB93F1CE}"/>
-              </a:ext>
-            </a:extLst>
-          </p:cNvPr>
-          <p:cNvPicPr>
-            <a:picLocks noChangeAspect="1"/>
-          </p:cNvPicPr>
-          <p:nvPr/>
-        </p:nvPicPr>
-        <p:blipFill>
-          <a:blip r:embed="rId3"/>
-          <a:stretch>
-            <a:fillRect/>
-          </a:stretch>
-        </p:blipFill>
-        <p:spPr>
-          <a:xfrm rot="16532666">
-            <a:off x="7123921" y="2186849"/>
-            <a:ext cx="1499113" cy="390614"/>
-          </a:xfrm>
-          <a:prstGeom prst="rect">
-            <a:avLst/>
-          </a:prstGeom>
-        </p:spPr>
-      </p:pic>
-      <p:pic>
-        <p:nvPicPr>
-          <p:cNvPr id="13" name="Picture 12">
-            <a:extLst>
-              <a:ext uri="{FF2B5EF4-FFF2-40B4-BE49-F238E27FC236}">
-                <a16:creationId xmlns:a16="http://schemas.microsoft.com/office/drawing/2014/main" id="{F91BD985-6E63-194A-9EFD-4BC5747F4993}"/>
-              </a:ext>
-            </a:extLst>
-          </p:cNvPr>
-          <p:cNvPicPr>
-            <a:picLocks noChangeAspect="1"/>
-          </p:cNvPicPr>
-          <p:nvPr/>
-        </p:nvPicPr>
-        <p:blipFill>
-          <a:blip r:embed="rId4"/>
-          <a:stretch>
-            <a:fillRect/>
-          </a:stretch>
-        </p:blipFill>
-        <p:spPr>
-          <a:xfrm rot="2645702">
-            <a:off x="1513894" y="5091791"/>
-            <a:ext cx="1152033" cy="413837"/>
-          </a:xfrm>
-          <a:prstGeom prst="rect">
-            <a:avLst/>
-          </a:prstGeom>
-        </p:spPr>
-      </p:pic>
-      <p:pic>
-        <p:nvPicPr>
-          <p:cNvPr id="15" name="Picture 14">
-            <a:extLst>
-              <a:ext uri="{FF2B5EF4-FFF2-40B4-BE49-F238E27FC236}">
-                <a16:creationId xmlns:a16="http://schemas.microsoft.com/office/drawing/2014/main" id="{85FE687D-EE7D-EA44-8193-70F1F9EE4A55}"/>
-              </a:ext>
-            </a:extLst>
-          </p:cNvPr>
-          <p:cNvPicPr>
-            <a:picLocks noChangeAspect="1"/>
-          </p:cNvPicPr>
-          <p:nvPr/>
-        </p:nvPicPr>
-        <p:blipFill>
-          <a:blip r:embed="rId5"/>
-          <a:stretch>
-            <a:fillRect/>
-          </a:stretch>
-        </p:blipFill>
-        <p:spPr>
-          <a:xfrm rot="19368376">
-            <a:off x="5542566" y="5131585"/>
-            <a:ext cx="1879600" cy="546100"/>
+            <a:off x="7686652" y="1194573"/>
+            <a:ext cx="979589" cy="4468854"/>
           </a:xfrm>
           <a:prstGeom prst="rect">
             <a:avLst/>
@@ -3457,7 +3156,7 @@
 <file path=ppt/theme/theme1.xml><?xml version="1.0" encoding="utf-8"?>
 <a:theme xmlns:a="http://schemas.openxmlformats.org/drawingml/2006/main" name="Office Theme">
   <a:themeElements>
-    <a:clrScheme name="Office">
+    <a:clrScheme name="Office Theme">
       <a:dk1>
         <a:sysClr val="windowText" lastClr="000000"/>
       </a:dk1>
@@ -3495,7 +3194,7 @@
         <a:srgbClr val="954F72"/>
       </a:folHlink>
     </a:clrScheme>
-    <a:fontScheme name="Office">
+    <a:fontScheme name="Office Theme">
       <a:majorFont>
         <a:latin typeface="Calibri Light" panose="020F0302020204030204"/>
         <a:ea typeface=""/>
@@ -3530,23 +3229,6 @@
         <a:font script="Viet" typeface="Times New Roman"/>
         <a:font script="Uigh" typeface="Microsoft Uighur"/>
         <a:font script="Geor" typeface="Sylfaen"/>
-        <a:font script="Armn" typeface="Arial"/>
-        <a:font script="Bugi" typeface="Leelawadee UI"/>
-        <a:font script="Bopo" typeface="Microsoft JhengHei"/>
-        <a:font script="Java" typeface="Javanese Text"/>
-        <a:font script="Lisu" typeface="Segoe UI"/>
-        <a:font script="Mymr" typeface="Myanmar Text"/>
-        <a:font script="Nkoo" typeface="Ebrima"/>
-        <a:font script="Olck" typeface="Nirmala UI"/>
-        <a:font script="Osma" typeface="Ebrima"/>
-        <a:font script="Phag" typeface="Phagspa"/>
-        <a:font script="Syrn" typeface="Estrangelo Edessa"/>
-        <a:font script="Syrj" typeface="Estrangelo Edessa"/>
-        <a:font script="Syre" typeface="Estrangelo Edessa"/>
-        <a:font script="Sora" typeface="Nirmala UI"/>
-        <a:font script="Tale" typeface="Microsoft Tai Le"/>
-        <a:font script="Talu" typeface="Microsoft New Tai Lue"/>
-        <a:font script="Tfng" typeface="Ebrima"/>
       </a:majorFont>
       <a:minorFont>
         <a:latin typeface="Calibri" panose="020F0502020204030204"/>
@@ -3582,26 +3264,9 @@
         <a:font script="Viet" typeface="Arial"/>
         <a:font script="Uigh" typeface="Microsoft Uighur"/>
         <a:font script="Geor" typeface="Sylfaen"/>
-        <a:font script="Armn" typeface="Arial"/>
-        <a:font script="Bugi" typeface="Leelawadee UI"/>
-        <a:font script="Bopo" typeface="Microsoft JhengHei"/>
-        <a:font script="Java" typeface="Javanese Text"/>
-        <a:font script="Lisu" typeface="Segoe UI"/>
-        <a:font script="Mymr" typeface="Myanmar Text"/>
-        <a:font script="Nkoo" typeface="Ebrima"/>
-        <a:font script="Olck" typeface="Nirmala UI"/>
-        <a:font script="Osma" typeface="Ebrima"/>
-        <a:font script="Phag" typeface="Phagspa"/>
-        <a:font script="Syrn" typeface="Estrangelo Edessa"/>
-        <a:font script="Syrj" typeface="Estrangelo Edessa"/>
-        <a:font script="Syre" typeface="Estrangelo Edessa"/>
-        <a:font script="Sora" typeface="Nirmala UI"/>
-        <a:font script="Tale" typeface="Microsoft Tai Le"/>
-        <a:font script="Talu" typeface="Microsoft New Tai Lue"/>
-        <a:font script="Tfng" typeface="Ebrima"/>
       </a:minorFont>
     </a:fontScheme>
-    <a:fmtScheme name="Office">
+    <a:fmtScheme name="Office Theme">
       <a:fillStyleLst>
         <a:solidFill>
           <a:schemeClr val="phClr"/>

</xml_diff>